<commit_message>
creating script for file dump to s3
</commit_message>
<xml_diff>
--- a/Galvanize Capstone Process.pptx
+++ b/Galvanize Capstone Process.pptx
@@ -5,13 +5,17 @@
     <p:sldMasterId id="2147483648" r:id="rId1"/>
   </p:sldMasterIdLst>
   <p:notesMasterIdLst>
-    <p:notesMasterId r:id="rId6"/>
+    <p:notesMasterId r:id="rId10"/>
   </p:notesMasterIdLst>
   <p:sldIdLst>
     <p:sldId id="256" r:id="rId2"/>
     <p:sldId id="258" r:id="rId3"/>
     <p:sldId id="259" r:id="rId4"/>
     <p:sldId id="260" r:id="rId5"/>
+    <p:sldId id="261" r:id="rId6"/>
+    <p:sldId id="264" r:id="rId7"/>
+    <p:sldId id="262" r:id="rId8"/>
+    <p:sldId id="263" r:id="rId9"/>
   </p:sldIdLst>
   <p:sldSz cx="12192000" cy="6858000"/>
   <p:notesSz cx="6858000" cy="9144000"/>
@@ -110,6 +114,11 @@
       </a:defRPr>
     </a:lvl9pPr>
   </p:defaultTextStyle>
+  <p:extLst>
+    <p:ext uri="{EFAFB233-063F-42B5-8137-9DF3F51BA10A}">
+      <p15:sldGuideLst xmlns:p15="http://schemas.microsoft.com/office/powerpoint/2012/main"/>
+    </p:ext>
+  </p:extLst>
 </p:presentation>
 </file>
 
@@ -195,7 +204,7 @@
           <a:p>
             <a:fld id="{06A1DF3A-DE3A-344E-9DD6-13296F177B4B}" type="datetimeFigureOut">
               <a:rPr lang="en-US" smtClean="0"/>
-              <a:t>12/10/18</a:t>
+              <a:t>12/11/18</a:t>
             </a:fld>
             <a:endParaRPr lang="en-US"/>
           </a:p>
@@ -594,7 +603,7 @@
           <a:p>
             <a:fld id="{7ADDD86B-D938-5C48-B0F8-BA66CAE5CCC0}" type="datetimeFigureOut">
               <a:rPr lang="en-US" smtClean="0"/>
-              <a:t>12/10/18</a:t>
+              <a:t>12/11/18</a:t>
             </a:fld>
             <a:endParaRPr lang="en-US"/>
           </a:p>
@@ -764,7 +773,7 @@
           <a:p>
             <a:fld id="{7ADDD86B-D938-5C48-B0F8-BA66CAE5CCC0}" type="datetimeFigureOut">
               <a:rPr lang="en-US" smtClean="0"/>
-              <a:t>12/10/18</a:t>
+              <a:t>12/11/18</a:t>
             </a:fld>
             <a:endParaRPr lang="en-US"/>
           </a:p>
@@ -944,7 +953,7 @@
           <a:p>
             <a:fld id="{7ADDD86B-D938-5C48-B0F8-BA66CAE5CCC0}" type="datetimeFigureOut">
               <a:rPr lang="en-US" smtClean="0"/>
-              <a:t>12/10/18</a:t>
+              <a:t>12/11/18</a:t>
             </a:fld>
             <a:endParaRPr lang="en-US"/>
           </a:p>
@@ -1114,7 +1123,7 @@
           <a:p>
             <a:fld id="{7ADDD86B-D938-5C48-B0F8-BA66CAE5CCC0}" type="datetimeFigureOut">
               <a:rPr lang="en-US" smtClean="0"/>
-              <a:t>12/10/18</a:t>
+              <a:t>12/11/18</a:t>
             </a:fld>
             <a:endParaRPr lang="en-US"/>
           </a:p>
@@ -1360,7 +1369,7 @@
           <a:p>
             <a:fld id="{7ADDD86B-D938-5C48-B0F8-BA66CAE5CCC0}" type="datetimeFigureOut">
               <a:rPr lang="en-US" smtClean="0"/>
-              <a:t>12/10/18</a:t>
+              <a:t>12/11/18</a:t>
             </a:fld>
             <a:endParaRPr lang="en-US"/>
           </a:p>
@@ -1592,7 +1601,7 @@
           <a:p>
             <a:fld id="{7ADDD86B-D938-5C48-B0F8-BA66CAE5CCC0}" type="datetimeFigureOut">
               <a:rPr lang="en-US" smtClean="0"/>
-              <a:t>12/10/18</a:t>
+              <a:t>12/11/18</a:t>
             </a:fld>
             <a:endParaRPr lang="en-US"/>
           </a:p>
@@ -1959,7 +1968,7 @@
           <a:p>
             <a:fld id="{7ADDD86B-D938-5C48-B0F8-BA66CAE5CCC0}" type="datetimeFigureOut">
               <a:rPr lang="en-US" smtClean="0"/>
-              <a:t>12/10/18</a:t>
+              <a:t>12/11/18</a:t>
             </a:fld>
             <a:endParaRPr lang="en-US"/>
           </a:p>
@@ -2077,7 +2086,7 @@
           <a:p>
             <a:fld id="{7ADDD86B-D938-5C48-B0F8-BA66CAE5CCC0}" type="datetimeFigureOut">
               <a:rPr lang="en-US" smtClean="0"/>
-              <a:t>12/10/18</a:t>
+              <a:t>12/11/18</a:t>
             </a:fld>
             <a:endParaRPr lang="en-US"/>
           </a:p>
@@ -2172,7 +2181,7 @@
           <a:p>
             <a:fld id="{7ADDD86B-D938-5C48-B0F8-BA66CAE5CCC0}" type="datetimeFigureOut">
               <a:rPr lang="en-US" smtClean="0"/>
-              <a:t>12/10/18</a:t>
+              <a:t>12/11/18</a:t>
             </a:fld>
             <a:endParaRPr lang="en-US"/>
           </a:p>
@@ -2449,7 +2458,7 @@
           <a:p>
             <a:fld id="{7ADDD86B-D938-5C48-B0F8-BA66CAE5CCC0}" type="datetimeFigureOut">
               <a:rPr lang="en-US" smtClean="0"/>
-              <a:t>12/10/18</a:t>
+              <a:t>12/11/18</a:t>
             </a:fld>
             <a:endParaRPr lang="en-US"/>
           </a:p>
@@ -2702,7 +2711,7 @@
           <a:p>
             <a:fld id="{7ADDD86B-D938-5C48-B0F8-BA66CAE5CCC0}" type="datetimeFigureOut">
               <a:rPr lang="en-US" smtClean="0"/>
-              <a:t>12/10/18</a:t>
+              <a:t>12/11/18</a:t>
             </a:fld>
             <a:endParaRPr lang="en-US"/>
           </a:p>
@@ -2915,7 +2924,7 @@
           <a:p>
             <a:fld id="{7ADDD86B-D938-5C48-B0F8-BA66CAE5CCC0}" type="datetimeFigureOut">
               <a:rPr lang="en-US" smtClean="0"/>
-              <a:t>12/10/18</a:t>
+              <a:t>12/11/18</a:t>
             </a:fld>
             <a:endParaRPr lang="en-US"/>
           </a:p>
@@ -3797,6 +3806,489 @@
     <p:extLst>
       <p:ext uri="{BB962C8B-B14F-4D97-AF65-F5344CB8AC3E}">
         <p14:creationId xmlns:p14="http://schemas.microsoft.com/office/powerpoint/2010/main" val="184567233"/>
+      </p:ext>
+    </p:extLst>
+  </p:cSld>
+  <p:clrMapOvr>
+    <a:masterClrMapping/>
+  </p:clrMapOvr>
+</p:sld>
+</file>
+
+<file path=ppt/slides/slide5.xml><?xml version="1.0" encoding="utf-8"?>
+<p:sld xmlns:a="http://schemas.openxmlformats.org/drawingml/2006/main" xmlns:r="http://schemas.openxmlformats.org/officeDocument/2006/relationships" xmlns:p="http://schemas.openxmlformats.org/presentationml/2006/main">
+  <p:cSld>
+    <p:spTree>
+      <p:nvGrpSpPr>
+        <p:cNvPr id="1" name=""/>
+        <p:cNvGrpSpPr/>
+        <p:nvPr/>
+      </p:nvGrpSpPr>
+      <p:grpSpPr>
+        <a:xfrm>
+          <a:off x="0" y="0"/>
+          <a:ext cx="0" cy="0"/>
+          <a:chOff x="0" y="0"/>
+          <a:chExt cx="0" cy="0"/>
+        </a:xfrm>
+      </p:grpSpPr>
+      <p:sp>
+        <p:nvSpPr>
+          <p:cNvPr id="2" name="TextBox 1"/>
+          <p:cNvSpPr txBox="1"/>
+          <p:nvPr/>
+        </p:nvSpPr>
+        <p:spPr>
+          <a:xfrm>
+            <a:off x="945224" y="441789"/>
+            <a:ext cx="7176388" cy="830997"/>
+          </a:xfrm>
+          <a:prstGeom prst="rect">
+            <a:avLst/>
+          </a:prstGeom>
+          <a:noFill/>
+        </p:spPr>
+        <p:txBody>
+          <a:bodyPr wrap="none" rtlCol="0">
+            <a:spAutoFit/>
+          </a:bodyPr>
+          <a:lstStyle/>
+          <a:p>
+            <a:r>
+              <a:rPr lang="en-US" sz="2400" dirty="0" smtClean="0"/>
+              <a:t>Amazon Web Services: </a:t>
+            </a:r>
+            <a:r>
+              <a:rPr lang="en-US" sz="2400" dirty="0"/>
+              <a:t>Create an S3 bucket for our data.</a:t>
+            </a:r>
+          </a:p>
+          <a:p>
+            <a:endParaRPr lang="en-US" sz="2400" dirty="0"/>
+          </a:p>
+        </p:txBody>
+      </p:sp>
+      <p:pic>
+        <p:nvPicPr>
+          <p:cNvPr id="4" name="Picture 3"/>
+          <p:cNvPicPr>
+            <a:picLocks noChangeAspect="1"/>
+          </p:cNvPicPr>
+          <p:nvPr/>
+        </p:nvPicPr>
+        <p:blipFill>
+          <a:blip r:embed="rId2">
+            <a:extLst>
+              <a:ext uri="{28A0092B-C50C-407E-A947-70E740481C1C}">
+                <a14:useLocalDpi xmlns:a14="http://schemas.microsoft.com/office/drawing/2010/main" val="0"/>
+              </a:ext>
+            </a:extLst>
+          </a:blip>
+          <a:stretch>
+            <a:fillRect/>
+          </a:stretch>
+        </p:blipFill>
+        <p:spPr>
+          <a:xfrm>
+            <a:off x="4533418" y="1001852"/>
+            <a:ext cx="7074091" cy="5585214"/>
+          </a:xfrm>
+          <a:prstGeom prst="rect">
+            <a:avLst/>
+          </a:prstGeom>
+        </p:spPr>
+      </p:pic>
+      <p:sp>
+        <p:nvSpPr>
+          <p:cNvPr id="5" name="TextBox 4"/>
+          <p:cNvSpPr txBox="1"/>
+          <p:nvPr/>
+        </p:nvSpPr>
+        <p:spPr>
+          <a:xfrm>
+            <a:off x="643468" y="2556933"/>
+            <a:ext cx="3403600" cy="646331"/>
+          </a:xfrm>
+          <a:prstGeom prst="rect">
+            <a:avLst/>
+          </a:prstGeom>
+          <a:noFill/>
+        </p:spPr>
+        <p:txBody>
+          <a:bodyPr wrap="square" rtlCol="0">
+            <a:spAutoFit/>
+          </a:bodyPr>
+          <a:lstStyle/>
+          <a:p>
+            <a:r>
+              <a:rPr lang="en-US" dirty="0" smtClean="0"/>
+              <a:t>Need to change access to write to the </a:t>
+            </a:r>
+            <a:r>
+              <a:rPr lang="en-US" smtClean="0"/>
+              <a:t>bucket </a:t>
+            </a:r>
+            <a:r>
+              <a:rPr lang="en-US" dirty="0" err="1" smtClean="0"/>
+              <a:t>galvcap</a:t>
+            </a:r>
+            <a:r>
+              <a:rPr lang="en-US" dirty="0" smtClean="0"/>
+              <a:t>-leg.</a:t>
+            </a:r>
+            <a:endParaRPr lang="en-US" dirty="0"/>
+          </a:p>
+        </p:txBody>
+      </p:sp>
+    </p:spTree>
+    <p:extLst>
+      <p:ext uri="{BB962C8B-B14F-4D97-AF65-F5344CB8AC3E}">
+        <p14:creationId xmlns:p14="http://schemas.microsoft.com/office/powerpoint/2010/main" val="1930115653"/>
+      </p:ext>
+    </p:extLst>
+  </p:cSld>
+  <p:clrMapOvr>
+    <a:masterClrMapping/>
+  </p:clrMapOvr>
+</p:sld>
+</file>
+
+<file path=ppt/slides/slide6.xml><?xml version="1.0" encoding="utf-8"?>
+<p:sld xmlns:a="http://schemas.openxmlformats.org/drawingml/2006/main" xmlns:r="http://schemas.openxmlformats.org/officeDocument/2006/relationships" xmlns:p="http://schemas.openxmlformats.org/presentationml/2006/main">
+  <p:cSld>
+    <p:spTree>
+      <p:nvGrpSpPr>
+        <p:cNvPr id="1" name=""/>
+        <p:cNvGrpSpPr/>
+        <p:nvPr/>
+      </p:nvGrpSpPr>
+      <p:grpSpPr>
+        <a:xfrm>
+          <a:off x="0" y="0"/>
+          <a:ext cx="0" cy="0"/>
+          <a:chOff x="0" y="0"/>
+          <a:chExt cx="0" cy="0"/>
+        </a:xfrm>
+      </p:grpSpPr>
+      <p:sp>
+        <p:nvSpPr>
+          <p:cNvPr id="2" name="TextBox 1"/>
+          <p:cNvSpPr txBox="1"/>
+          <p:nvPr/>
+        </p:nvSpPr>
+        <p:spPr>
+          <a:xfrm>
+            <a:off x="945224" y="462571"/>
+            <a:ext cx="7176388" cy="461665"/>
+          </a:xfrm>
+          <a:prstGeom prst="rect">
+            <a:avLst/>
+          </a:prstGeom>
+          <a:noFill/>
+        </p:spPr>
+        <p:txBody>
+          <a:bodyPr wrap="none" rtlCol="0">
+            <a:spAutoFit/>
+          </a:bodyPr>
+          <a:lstStyle/>
+          <a:p>
+            <a:r>
+              <a:rPr lang="en-US" sz="2400" dirty="0" smtClean="0"/>
+              <a:t>Amazon Web Services: </a:t>
+            </a:r>
+            <a:r>
+              <a:rPr lang="en-US" sz="2400" dirty="0"/>
+              <a:t>Create an S3 bucket for our </a:t>
+            </a:r>
+            <a:r>
+              <a:rPr lang="en-US" sz="2400"/>
+              <a:t>data</a:t>
+            </a:r>
+            <a:r>
+              <a:rPr lang="en-US" sz="2400" smtClean="0"/>
+              <a:t>.</a:t>
+            </a:r>
+            <a:endParaRPr lang="en-US" sz="2400" dirty="0"/>
+          </a:p>
+        </p:txBody>
+      </p:sp>
+      <p:sp>
+        <p:nvSpPr>
+          <p:cNvPr id="5" name="TextBox 4"/>
+          <p:cNvSpPr txBox="1"/>
+          <p:nvPr/>
+        </p:nvSpPr>
+        <p:spPr>
+          <a:xfrm>
+            <a:off x="2349854" y="4267199"/>
+            <a:ext cx="6679492" cy="369332"/>
+          </a:xfrm>
+          <a:prstGeom prst="rect">
+            <a:avLst/>
+          </a:prstGeom>
+          <a:noFill/>
+        </p:spPr>
+        <p:txBody>
+          <a:bodyPr wrap="square" rtlCol="0">
+            <a:spAutoFit/>
+          </a:bodyPr>
+          <a:lstStyle/>
+          <a:p>
+            <a:pPr algn="ctr"/>
+            <a:r>
+              <a:rPr lang="en-US" dirty="0" smtClean="0"/>
+              <a:t>Change all of the above values </a:t>
+            </a:r>
+            <a:r>
+              <a:rPr lang="en-US" smtClean="0"/>
+              <a:t>to False.</a:t>
+            </a:r>
+            <a:endParaRPr lang="en-US" dirty="0"/>
+          </a:p>
+        </p:txBody>
+      </p:sp>
+      <p:pic>
+        <p:nvPicPr>
+          <p:cNvPr id="3" name="Picture 2"/>
+          <p:cNvPicPr>
+            <a:picLocks noChangeAspect="1"/>
+          </p:cNvPicPr>
+          <p:nvPr/>
+        </p:nvPicPr>
+        <p:blipFill>
+          <a:blip r:embed="rId2">
+            <a:extLst>
+              <a:ext uri="{28A0092B-C50C-407E-A947-70E740481C1C}">
+                <a14:useLocalDpi xmlns:a14="http://schemas.microsoft.com/office/drawing/2010/main" val="0"/>
+              </a:ext>
+            </a:extLst>
+          </a:blip>
+          <a:stretch>
+            <a:fillRect/>
+          </a:stretch>
+        </p:blipFill>
+        <p:spPr>
+          <a:xfrm>
+            <a:off x="1303868" y="1450330"/>
+            <a:ext cx="8442806" cy="2263351"/>
+          </a:xfrm>
+          <a:prstGeom prst="rect">
+            <a:avLst/>
+          </a:prstGeom>
+        </p:spPr>
+      </p:pic>
+    </p:spTree>
+    <p:extLst>
+      <p:ext uri="{BB962C8B-B14F-4D97-AF65-F5344CB8AC3E}">
+        <p14:creationId xmlns:p14="http://schemas.microsoft.com/office/powerpoint/2010/main" val="2143242786"/>
+      </p:ext>
+    </p:extLst>
+  </p:cSld>
+  <p:clrMapOvr>
+    <a:masterClrMapping/>
+  </p:clrMapOvr>
+</p:sld>
+</file>
+
+<file path=ppt/slides/slide7.xml><?xml version="1.0" encoding="utf-8"?>
+<p:sld xmlns:a="http://schemas.openxmlformats.org/drawingml/2006/main" xmlns:r="http://schemas.openxmlformats.org/officeDocument/2006/relationships" xmlns:p="http://schemas.openxmlformats.org/presentationml/2006/main">
+  <p:cSld>
+    <p:spTree>
+      <p:nvGrpSpPr>
+        <p:cNvPr id="1" name=""/>
+        <p:cNvGrpSpPr/>
+        <p:nvPr/>
+      </p:nvGrpSpPr>
+      <p:grpSpPr>
+        <a:xfrm>
+          <a:off x="0" y="0"/>
+          <a:ext cx="0" cy="0"/>
+          <a:chOff x="0" y="0"/>
+          <a:chExt cx="0" cy="0"/>
+        </a:xfrm>
+      </p:grpSpPr>
+      <p:sp>
+        <p:nvSpPr>
+          <p:cNvPr id="2" name="TextBox 1"/>
+          <p:cNvSpPr txBox="1"/>
+          <p:nvPr/>
+        </p:nvSpPr>
+        <p:spPr>
+          <a:xfrm>
+            <a:off x="945224" y="441789"/>
+            <a:ext cx="7176388" cy="461665"/>
+          </a:xfrm>
+          <a:prstGeom prst="rect">
+            <a:avLst/>
+          </a:prstGeom>
+          <a:noFill/>
+        </p:spPr>
+        <p:txBody>
+          <a:bodyPr wrap="none" rtlCol="0">
+            <a:spAutoFit/>
+          </a:bodyPr>
+          <a:lstStyle/>
+          <a:p>
+            <a:r>
+              <a:rPr lang="en-US" sz="2400" dirty="0" smtClean="0"/>
+              <a:t>Amazon Web Services: </a:t>
+            </a:r>
+            <a:r>
+              <a:rPr lang="en-US" sz="2400" dirty="0"/>
+              <a:t>Create an S3 bucket for our </a:t>
+            </a:r>
+            <a:r>
+              <a:rPr lang="en-US" sz="2400"/>
+              <a:t>data</a:t>
+            </a:r>
+            <a:r>
+              <a:rPr lang="en-US" sz="2400" smtClean="0"/>
+              <a:t>.</a:t>
+            </a:r>
+            <a:endParaRPr lang="en-US" sz="2400" dirty="0"/>
+          </a:p>
+        </p:txBody>
+      </p:sp>
+      <p:pic>
+        <p:nvPicPr>
+          <p:cNvPr id="3" name="Picture 2"/>
+          <p:cNvPicPr>
+            <a:picLocks noChangeAspect="1"/>
+          </p:cNvPicPr>
+          <p:nvPr/>
+        </p:nvPicPr>
+        <p:blipFill>
+          <a:blip r:embed="rId2">
+            <a:extLst>
+              <a:ext uri="{28A0092B-C50C-407E-A947-70E740481C1C}">
+                <a14:useLocalDpi xmlns:a14="http://schemas.microsoft.com/office/drawing/2010/main" val="0"/>
+              </a:ext>
+            </a:extLst>
+          </a:blip>
+          <a:stretch>
+            <a:fillRect/>
+          </a:stretch>
+        </p:blipFill>
+        <p:spPr>
+          <a:xfrm>
+            <a:off x="5618806" y="1539633"/>
+            <a:ext cx="6252522" cy="4591580"/>
+          </a:xfrm>
+          <a:prstGeom prst="rect">
+            <a:avLst/>
+          </a:prstGeom>
+        </p:spPr>
+      </p:pic>
+      <p:sp>
+        <p:nvSpPr>
+          <p:cNvPr id="4" name="TextBox 3"/>
+          <p:cNvSpPr txBox="1"/>
+          <p:nvPr/>
+        </p:nvSpPr>
+        <p:spPr>
+          <a:xfrm>
+            <a:off x="945224" y="5011910"/>
+            <a:ext cx="4000849" cy="954107"/>
+          </a:xfrm>
+          <a:prstGeom prst="rect">
+            <a:avLst/>
+          </a:prstGeom>
+          <a:noFill/>
+        </p:spPr>
+        <p:txBody>
+          <a:bodyPr wrap="square" rtlCol="0">
+            <a:spAutoFit/>
+          </a:bodyPr>
+          <a:lstStyle/>
+          <a:p>
+            <a:r>
+              <a:rPr lang="en-US" sz="1400" dirty="0"/>
+              <a:t>{ "Version": "2008-10-17", "Statement": [ { "Sid": "</a:t>
+            </a:r>
+            <a:r>
+              <a:rPr lang="en-US" sz="1400" dirty="0" err="1"/>
+              <a:t>AllowPublicRead</a:t>
+            </a:r>
+            <a:r>
+              <a:rPr lang="en-US" sz="1400" dirty="0"/>
+              <a:t>", "Effect": "Allow", "Principal": { "AWS": "*" }, "Action": "s3:GetObject", "Resource": "arn:aws:s3:::&lt;your bucket name&gt;/*" } ] }</a:t>
+            </a:r>
+          </a:p>
+        </p:txBody>
+      </p:sp>
+      <p:sp>
+        <p:nvSpPr>
+          <p:cNvPr id="5" name="TextBox 4"/>
+          <p:cNvSpPr txBox="1"/>
+          <p:nvPr/>
+        </p:nvSpPr>
+        <p:spPr>
+          <a:xfrm>
+            <a:off x="780920" y="1911927"/>
+            <a:ext cx="4165153" cy="1754326"/>
+          </a:xfrm>
+          <a:prstGeom prst="rect">
+            <a:avLst/>
+          </a:prstGeom>
+          <a:noFill/>
+        </p:spPr>
+        <p:txBody>
+          <a:bodyPr wrap="square" rtlCol="0">
+            <a:spAutoFit/>
+          </a:bodyPr>
+          <a:lstStyle/>
+          <a:p>
+            <a:r>
+              <a:rPr lang="en-US" dirty="0" smtClean="0"/>
+              <a:t>Add the code below to change bucket policy. </a:t>
+            </a:r>
+          </a:p>
+          <a:p>
+            <a:endParaRPr lang="en-US" dirty="0"/>
+          </a:p>
+          <a:p>
+            <a:r>
+              <a:rPr lang="en-US" dirty="0" smtClean="0"/>
+              <a:t>Once the data is loaded, you may want to change access to the data so only the EC2 instance is able to retrieve what it needs.</a:t>
+            </a:r>
+            <a:endParaRPr lang="en-US" dirty="0"/>
+          </a:p>
+        </p:txBody>
+      </p:sp>
+    </p:spTree>
+    <p:extLst>
+      <p:ext uri="{BB962C8B-B14F-4D97-AF65-F5344CB8AC3E}">
+        <p14:creationId xmlns:p14="http://schemas.microsoft.com/office/powerpoint/2010/main" val="1374547045"/>
+      </p:ext>
+    </p:extLst>
+  </p:cSld>
+  <p:clrMapOvr>
+    <a:masterClrMapping/>
+  </p:clrMapOvr>
+</p:sld>
+</file>
+
+<file path=ppt/slides/slide8.xml><?xml version="1.0" encoding="utf-8"?>
+<p:sld xmlns:a="http://schemas.openxmlformats.org/drawingml/2006/main" xmlns:r="http://schemas.openxmlformats.org/officeDocument/2006/relationships" xmlns:p="http://schemas.openxmlformats.org/presentationml/2006/main">
+  <p:cSld>
+    <p:spTree>
+      <p:nvGrpSpPr>
+        <p:cNvPr id="1" name=""/>
+        <p:cNvGrpSpPr/>
+        <p:nvPr/>
+      </p:nvGrpSpPr>
+      <p:grpSpPr>
+        <a:xfrm>
+          <a:off x="0" y="0"/>
+          <a:ext cx="0" cy="0"/>
+          <a:chOff x="0" y="0"/>
+          <a:chExt cx="0" cy="0"/>
+        </a:xfrm>
+      </p:grpSpPr>
+    </p:spTree>
+    <p:extLst>
+      <p:ext uri="{BB962C8B-B14F-4D97-AF65-F5344CB8AC3E}">
+        <p14:creationId xmlns:p14="http://schemas.microsoft.com/office/powerpoint/2010/main" val="1530594536"/>
       </p:ext>
     </p:extLst>
   </p:cSld>

</xml_diff>

<commit_message>
first prediction with prelim model using basic nlp
</commit_message>
<xml_diff>
--- a/Galvanize Capstone Process.pptx
+++ b/Galvanize Capstone Process.pptx
@@ -5,7 +5,7 @@
     <p:sldMasterId id="2147483648" r:id="rId1"/>
   </p:sldMasterIdLst>
   <p:notesMasterIdLst>
-    <p:notesMasterId r:id="rId11"/>
+    <p:notesMasterId r:id="rId12"/>
   </p:notesMasterIdLst>
   <p:sldIdLst>
     <p:sldId id="256" r:id="rId2"/>
@@ -17,6 +17,7 @@
     <p:sldId id="264" r:id="rId8"/>
     <p:sldId id="262" r:id="rId9"/>
     <p:sldId id="263" r:id="rId10"/>
+    <p:sldId id="266" r:id="rId11"/>
   </p:sldIdLst>
   <p:sldSz cx="12192000" cy="6858000"/>
   <p:notesSz cx="6858000" cy="9144000"/>
@@ -205,7 +206,7 @@
           <a:p>
             <a:fld id="{06A1DF3A-DE3A-344E-9DD6-13296F177B4B}" type="datetimeFigureOut">
               <a:rPr lang="en-US" smtClean="0"/>
-              <a:t>12/11/18</a:t>
+              <a:t>12/13/18</a:t>
             </a:fld>
             <a:endParaRPr lang="en-US"/>
           </a:p>
@@ -604,7 +605,7 @@
           <a:p>
             <a:fld id="{7ADDD86B-D938-5C48-B0F8-BA66CAE5CCC0}" type="datetimeFigureOut">
               <a:rPr lang="en-US" smtClean="0"/>
-              <a:t>12/11/18</a:t>
+              <a:t>12/13/18</a:t>
             </a:fld>
             <a:endParaRPr lang="en-US"/>
           </a:p>
@@ -774,7 +775,7 @@
           <a:p>
             <a:fld id="{7ADDD86B-D938-5C48-B0F8-BA66CAE5CCC0}" type="datetimeFigureOut">
               <a:rPr lang="en-US" smtClean="0"/>
-              <a:t>12/11/18</a:t>
+              <a:t>12/13/18</a:t>
             </a:fld>
             <a:endParaRPr lang="en-US"/>
           </a:p>
@@ -954,7 +955,7 @@
           <a:p>
             <a:fld id="{7ADDD86B-D938-5C48-B0F8-BA66CAE5CCC0}" type="datetimeFigureOut">
               <a:rPr lang="en-US" smtClean="0"/>
-              <a:t>12/11/18</a:t>
+              <a:t>12/13/18</a:t>
             </a:fld>
             <a:endParaRPr lang="en-US"/>
           </a:p>
@@ -1124,7 +1125,7 @@
           <a:p>
             <a:fld id="{7ADDD86B-D938-5C48-B0F8-BA66CAE5CCC0}" type="datetimeFigureOut">
               <a:rPr lang="en-US" smtClean="0"/>
-              <a:t>12/11/18</a:t>
+              <a:t>12/13/18</a:t>
             </a:fld>
             <a:endParaRPr lang="en-US"/>
           </a:p>
@@ -1370,7 +1371,7 @@
           <a:p>
             <a:fld id="{7ADDD86B-D938-5C48-B0F8-BA66CAE5CCC0}" type="datetimeFigureOut">
               <a:rPr lang="en-US" smtClean="0"/>
-              <a:t>12/11/18</a:t>
+              <a:t>12/13/18</a:t>
             </a:fld>
             <a:endParaRPr lang="en-US"/>
           </a:p>
@@ -1602,7 +1603,7 @@
           <a:p>
             <a:fld id="{7ADDD86B-D938-5C48-B0F8-BA66CAE5CCC0}" type="datetimeFigureOut">
               <a:rPr lang="en-US" smtClean="0"/>
-              <a:t>12/11/18</a:t>
+              <a:t>12/13/18</a:t>
             </a:fld>
             <a:endParaRPr lang="en-US"/>
           </a:p>
@@ -1969,7 +1970,7 @@
           <a:p>
             <a:fld id="{7ADDD86B-D938-5C48-B0F8-BA66CAE5CCC0}" type="datetimeFigureOut">
               <a:rPr lang="en-US" smtClean="0"/>
-              <a:t>12/11/18</a:t>
+              <a:t>12/13/18</a:t>
             </a:fld>
             <a:endParaRPr lang="en-US"/>
           </a:p>
@@ -2087,7 +2088,7 @@
           <a:p>
             <a:fld id="{7ADDD86B-D938-5C48-B0F8-BA66CAE5CCC0}" type="datetimeFigureOut">
               <a:rPr lang="en-US" smtClean="0"/>
-              <a:t>12/11/18</a:t>
+              <a:t>12/13/18</a:t>
             </a:fld>
             <a:endParaRPr lang="en-US"/>
           </a:p>
@@ -2182,7 +2183,7 @@
           <a:p>
             <a:fld id="{7ADDD86B-D938-5C48-B0F8-BA66CAE5CCC0}" type="datetimeFigureOut">
               <a:rPr lang="en-US" smtClean="0"/>
-              <a:t>12/11/18</a:t>
+              <a:t>12/13/18</a:t>
             </a:fld>
             <a:endParaRPr lang="en-US"/>
           </a:p>
@@ -2459,7 +2460,7 @@
           <a:p>
             <a:fld id="{7ADDD86B-D938-5C48-B0F8-BA66CAE5CCC0}" type="datetimeFigureOut">
               <a:rPr lang="en-US" smtClean="0"/>
-              <a:t>12/11/18</a:t>
+              <a:t>12/13/18</a:t>
             </a:fld>
             <a:endParaRPr lang="en-US"/>
           </a:p>
@@ -2712,7 +2713,7 @@
           <a:p>
             <a:fld id="{7ADDD86B-D938-5C48-B0F8-BA66CAE5CCC0}" type="datetimeFigureOut">
               <a:rPr lang="en-US" smtClean="0"/>
-              <a:t>12/11/18</a:t>
+              <a:t>12/13/18</a:t>
             </a:fld>
             <a:endParaRPr lang="en-US"/>
           </a:p>
@@ -2925,7 +2926,7 @@
           <a:p>
             <a:fld id="{7ADDD86B-D938-5C48-B0F8-BA66CAE5CCC0}" type="datetimeFigureOut">
               <a:rPr lang="en-US" smtClean="0"/>
-              <a:t>12/11/18</a:t>
+              <a:t>12/13/18</a:t>
             </a:fld>
             <a:endParaRPr lang="en-US"/>
           </a:p>
@@ -3372,6 +3373,226 @@
     <p:extLst>
       <p:ext uri="{BB962C8B-B14F-4D97-AF65-F5344CB8AC3E}">
         <p14:creationId xmlns:p14="http://schemas.microsoft.com/office/powerpoint/2010/main" val="1856836827"/>
+      </p:ext>
+    </p:extLst>
+  </p:cSld>
+  <p:clrMapOvr>
+    <a:masterClrMapping/>
+  </p:clrMapOvr>
+</p:sld>
+</file>
+
+<file path=ppt/slides/slide10.xml><?xml version="1.0" encoding="utf-8"?>
+<p:sld xmlns:a="http://schemas.openxmlformats.org/drawingml/2006/main" xmlns:r="http://schemas.openxmlformats.org/officeDocument/2006/relationships" xmlns:p="http://schemas.openxmlformats.org/presentationml/2006/main">
+  <p:cSld>
+    <p:spTree>
+      <p:nvGrpSpPr>
+        <p:cNvPr id="1" name=""/>
+        <p:cNvGrpSpPr/>
+        <p:nvPr/>
+      </p:nvGrpSpPr>
+      <p:grpSpPr>
+        <a:xfrm>
+          <a:off x="0" y="0"/>
+          <a:ext cx="0" cy="0"/>
+          <a:chOff x="0" y="0"/>
+          <a:chExt cx="0" cy="0"/>
+        </a:xfrm>
+      </p:grpSpPr>
+      <p:pic>
+        <p:nvPicPr>
+          <p:cNvPr id="2" name="Picture 1"/>
+          <p:cNvPicPr>
+            <a:picLocks noChangeAspect="1"/>
+          </p:cNvPicPr>
+          <p:nvPr/>
+        </p:nvPicPr>
+        <p:blipFill>
+          <a:blip r:embed="rId2">
+            <a:extLst>
+              <a:ext uri="{28A0092B-C50C-407E-A947-70E740481C1C}">
+                <a14:useLocalDpi xmlns:a14="http://schemas.microsoft.com/office/drawing/2010/main" val="0"/>
+              </a:ext>
+            </a:extLst>
+          </a:blip>
+          <a:stretch>
+            <a:fillRect/>
+          </a:stretch>
+        </p:blipFill>
+        <p:spPr>
+          <a:xfrm>
+            <a:off x="5179635" y="3697533"/>
+            <a:ext cx="5854700" cy="2146300"/>
+          </a:xfrm>
+          <a:prstGeom prst="rect">
+            <a:avLst/>
+          </a:prstGeom>
+        </p:spPr>
+      </p:pic>
+      <p:sp>
+        <p:nvSpPr>
+          <p:cNvPr id="3" name="TextBox 2"/>
+          <p:cNvSpPr txBox="1"/>
+          <p:nvPr/>
+        </p:nvSpPr>
+        <p:spPr>
+          <a:xfrm>
+            <a:off x="4374037" y="3134289"/>
+            <a:ext cx="6962227" cy="369332"/>
+          </a:xfrm>
+          <a:prstGeom prst="rect">
+            <a:avLst/>
+          </a:prstGeom>
+          <a:noFill/>
+        </p:spPr>
+        <p:txBody>
+          <a:bodyPr wrap="none" rtlCol="0">
+            <a:spAutoFit/>
+          </a:bodyPr>
+          <a:lstStyle/>
+          <a:p>
+            <a:r>
+              <a:rPr lang="en-US" dirty="0" smtClean="0"/>
+              <a:t>Results of first iteration with subset of existing data as it’s still rolling in</a:t>
+            </a:r>
+            <a:r>
+              <a:rPr lang="mr-IN" dirty="0" smtClean="0"/>
+              <a:t>…</a:t>
+            </a:r>
+            <a:endParaRPr lang="en-US" dirty="0" smtClean="0"/>
+          </a:p>
+        </p:txBody>
+      </p:sp>
+      <p:sp>
+        <p:nvSpPr>
+          <p:cNvPr id="4" name="TextBox 3"/>
+          <p:cNvSpPr txBox="1"/>
+          <p:nvPr/>
+        </p:nvSpPr>
+        <p:spPr>
+          <a:xfrm>
+            <a:off x="680300" y="571769"/>
+            <a:ext cx="2963247" cy="369332"/>
+          </a:xfrm>
+          <a:prstGeom prst="rect">
+            <a:avLst/>
+          </a:prstGeom>
+          <a:noFill/>
+        </p:spPr>
+        <p:txBody>
+          <a:bodyPr wrap="none" rtlCol="0">
+            <a:spAutoFit/>
+          </a:bodyPr>
+          <a:lstStyle/>
+          <a:p>
+            <a:r>
+              <a:rPr lang="en-US" dirty="0" smtClean="0"/>
+              <a:t>Natural </a:t>
+            </a:r>
+            <a:r>
+              <a:rPr lang="en-US" smtClean="0"/>
+              <a:t>Language Processing</a:t>
+            </a:r>
+            <a:endParaRPr lang="en-US" dirty="0" smtClean="0"/>
+          </a:p>
+        </p:txBody>
+      </p:sp>
+      <p:sp>
+        <p:nvSpPr>
+          <p:cNvPr id="5" name="TextBox 4"/>
+          <p:cNvSpPr txBox="1"/>
+          <p:nvPr/>
+        </p:nvSpPr>
+        <p:spPr>
+          <a:xfrm>
+            <a:off x="5608733" y="756435"/>
+            <a:ext cx="4492833" cy="1384995"/>
+          </a:xfrm>
+          <a:prstGeom prst="rect">
+            <a:avLst/>
+          </a:prstGeom>
+          <a:noFill/>
+        </p:spPr>
+        <p:txBody>
+          <a:bodyPr wrap="none" rtlCol="0">
+            <a:spAutoFit/>
+          </a:bodyPr>
+          <a:lstStyle/>
+          <a:p>
+            <a:pPr marL="285750" indent="-285750">
+              <a:buFont typeface="Arial" charset="0"/>
+              <a:buChar char="•"/>
+            </a:pPr>
+            <a:r>
+              <a:rPr lang="en-US" sz="1400" dirty="0" smtClean="0"/>
+              <a:t>TF-IDF: Term Frequency </a:t>
+            </a:r>
+            <a:r>
+              <a:rPr lang="mr-IN" sz="1400" dirty="0" smtClean="0"/>
+              <a:t>–</a:t>
+            </a:r>
+            <a:r>
+              <a:rPr lang="en-US" sz="1400" dirty="0" smtClean="0"/>
+              <a:t> Inverse Document Frequency</a:t>
+            </a:r>
+          </a:p>
+          <a:p>
+            <a:pPr marL="285750" indent="-285750">
+              <a:buFont typeface="Arial" charset="0"/>
+              <a:buChar char="•"/>
+            </a:pPr>
+            <a:r>
+              <a:rPr lang="en-US" sz="1400" dirty="0" smtClean="0"/>
+              <a:t>NLTK </a:t>
+            </a:r>
+            <a:r>
+              <a:rPr lang="en-US" sz="1400" dirty="0" err="1" smtClean="0"/>
+              <a:t>word_tokenize</a:t>
+            </a:r>
+            <a:r>
+              <a:rPr lang="en-US" sz="1400" dirty="0" smtClean="0"/>
+              <a:t> and </a:t>
+            </a:r>
+            <a:r>
+              <a:rPr lang="en-US" sz="1400" dirty="0" err="1" smtClean="0"/>
+              <a:t>stopwords</a:t>
+            </a:r>
+            <a:endParaRPr lang="en-US" sz="1400" dirty="0" smtClean="0"/>
+          </a:p>
+          <a:p>
+            <a:pPr marL="285750" indent="-285750">
+              <a:buFont typeface="Arial" charset="0"/>
+              <a:buChar char="•"/>
+            </a:pPr>
+            <a:r>
+              <a:rPr lang="en-US" sz="1400" dirty="0" err="1" smtClean="0"/>
+              <a:t>WordNetLemmatizer</a:t>
+            </a:r>
+            <a:endParaRPr lang="en-US" sz="1400" smtClean="0"/>
+          </a:p>
+          <a:p>
+            <a:pPr marL="285750" indent="-285750">
+              <a:buFont typeface="Arial" charset="0"/>
+              <a:buChar char="•"/>
+            </a:pPr>
+            <a:endParaRPr lang="en-US" sz="1400" dirty="0" smtClean="0"/>
+          </a:p>
+          <a:p>
+            <a:pPr marL="285750" indent="-285750">
+              <a:buFont typeface="Arial" charset="0"/>
+              <a:buChar char="•"/>
+            </a:pPr>
+            <a:endParaRPr lang="en-US" sz="1400" dirty="0" smtClean="0"/>
+          </a:p>
+          <a:p>
+            <a:endParaRPr lang="en-US" sz="1400" dirty="0" smtClean="0"/>
+          </a:p>
+        </p:txBody>
+      </p:sp>
+    </p:spTree>
+    <p:extLst>
+      <p:ext uri="{BB962C8B-B14F-4D97-AF65-F5344CB8AC3E}">
+        <p14:creationId xmlns:p14="http://schemas.microsoft.com/office/powerpoint/2010/main" val="1882988077"/>
       </p:ext>
     </p:extLst>
   </p:cSld>

</xml_diff>

<commit_message>
plotted scores vs. num features, explored latent features with NMF
</commit_message>
<xml_diff>
--- a/Galvanize Capstone Process.pptx
+++ b/Galvanize Capstone Process.pptx
@@ -5,7 +5,7 @@
     <p:sldMasterId id="2147483648" r:id="rId1"/>
   </p:sldMasterIdLst>
   <p:notesMasterIdLst>
-    <p:notesMasterId r:id="rId12"/>
+    <p:notesMasterId r:id="rId16"/>
   </p:notesMasterIdLst>
   <p:sldIdLst>
     <p:sldId id="256" r:id="rId2"/>
@@ -18,6 +18,10 @@
     <p:sldId id="262" r:id="rId9"/>
     <p:sldId id="263" r:id="rId10"/>
     <p:sldId id="266" r:id="rId11"/>
+    <p:sldId id="269" r:id="rId12"/>
+    <p:sldId id="270" r:id="rId13"/>
+    <p:sldId id="267" r:id="rId14"/>
+    <p:sldId id="268" r:id="rId15"/>
   </p:sldIdLst>
   <p:sldSz cx="12192000" cy="6858000"/>
   <p:notesSz cx="6858000" cy="9144000"/>
@@ -206,7 +210,7 @@
           <a:p>
             <a:fld id="{06A1DF3A-DE3A-344E-9DD6-13296F177B4B}" type="datetimeFigureOut">
               <a:rPr lang="en-US" smtClean="0"/>
-              <a:t>12/13/18</a:t>
+              <a:t>12/14/18</a:t>
             </a:fld>
             <a:endParaRPr lang="en-US"/>
           </a:p>
@@ -605,7 +609,7 @@
           <a:p>
             <a:fld id="{7ADDD86B-D938-5C48-B0F8-BA66CAE5CCC0}" type="datetimeFigureOut">
               <a:rPr lang="en-US" smtClean="0"/>
-              <a:t>12/13/18</a:t>
+              <a:t>12/14/18</a:t>
             </a:fld>
             <a:endParaRPr lang="en-US"/>
           </a:p>
@@ -775,7 +779,7 @@
           <a:p>
             <a:fld id="{7ADDD86B-D938-5C48-B0F8-BA66CAE5CCC0}" type="datetimeFigureOut">
               <a:rPr lang="en-US" smtClean="0"/>
-              <a:t>12/13/18</a:t>
+              <a:t>12/14/18</a:t>
             </a:fld>
             <a:endParaRPr lang="en-US"/>
           </a:p>
@@ -955,7 +959,7 @@
           <a:p>
             <a:fld id="{7ADDD86B-D938-5C48-B0F8-BA66CAE5CCC0}" type="datetimeFigureOut">
               <a:rPr lang="en-US" smtClean="0"/>
-              <a:t>12/13/18</a:t>
+              <a:t>12/14/18</a:t>
             </a:fld>
             <a:endParaRPr lang="en-US"/>
           </a:p>
@@ -1125,7 +1129,7 @@
           <a:p>
             <a:fld id="{7ADDD86B-D938-5C48-B0F8-BA66CAE5CCC0}" type="datetimeFigureOut">
               <a:rPr lang="en-US" smtClean="0"/>
-              <a:t>12/13/18</a:t>
+              <a:t>12/14/18</a:t>
             </a:fld>
             <a:endParaRPr lang="en-US"/>
           </a:p>
@@ -1371,7 +1375,7 @@
           <a:p>
             <a:fld id="{7ADDD86B-D938-5C48-B0F8-BA66CAE5CCC0}" type="datetimeFigureOut">
               <a:rPr lang="en-US" smtClean="0"/>
-              <a:t>12/13/18</a:t>
+              <a:t>12/14/18</a:t>
             </a:fld>
             <a:endParaRPr lang="en-US"/>
           </a:p>
@@ -1603,7 +1607,7 @@
           <a:p>
             <a:fld id="{7ADDD86B-D938-5C48-B0F8-BA66CAE5CCC0}" type="datetimeFigureOut">
               <a:rPr lang="en-US" smtClean="0"/>
-              <a:t>12/13/18</a:t>
+              <a:t>12/14/18</a:t>
             </a:fld>
             <a:endParaRPr lang="en-US"/>
           </a:p>
@@ -1970,7 +1974,7 @@
           <a:p>
             <a:fld id="{7ADDD86B-D938-5C48-B0F8-BA66CAE5CCC0}" type="datetimeFigureOut">
               <a:rPr lang="en-US" smtClean="0"/>
-              <a:t>12/13/18</a:t>
+              <a:t>12/14/18</a:t>
             </a:fld>
             <a:endParaRPr lang="en-US"/>
           </a:p>
@@ -2088,7 +2092,7 @@
           <a:p>
             <a:fld id="{7ADDD86B-D938-5C48-B0F8-BA66CAE5CCC0}" type="datetimeFigureOut">
               <a:rPr lang="en-US" smtClean="0"/>
-              <a:t>12/13/18</a:t>
+              <a:t>12/14/18</a:t>
             </a:fld>
             <a:endParaRPr lang="en-US"/>
           </a:p>
@@ -2183,7 +2187,7 @@
           <a:p>
             <a:fld id="{7ADDD86B-D938-5C48-B0F8-BA66CAE5CCC0}" type="datetimeFigureOut">
               <a:rPr lang="en-US" smtClean="0"/>
-              <a:t>12/13/18</a:t>
+              <a:t>12/14/18</a:t>
             </a:fld>
             <a:endParaRPr lang="en-US"/>
           </a:p>
@@ -2460,7 +2464,7 @@
           <a:p>
             <a:fld id="{7ADDD86B-D938-5C48-B0F8-BA66CAE5CCC0}" type="datetimeFigureOut">
               <a:rPr lang="en-US" smtClean="0"/>
-              <a:t>12/13/18</a:t>
+              <a:t>12/14/18</a:t>
             </a:fld>
             <a:endParaRPr lang="en-US"/>
           </a:p>
@@ -2713,7 +2717,7 @@
           <a:p>
             <a:fld id="{7ADDD86B-D938-5C48-B0F8-BA66CAE5CCC0}" type="datetimeFigureOut">
               <a:rPr lang="en-US" smtClean="0"/>
-              <a:t>12/13/18</a:t>
+              <a:t>12/14/18</a:t>
             </a:fld>
             <a:endParaRPr lang="en-US"/>
           </a:p>
@@ -2926,7 +2930,7 @@
           <a:p>
             <a:fld id="{7ADDD86B-D938-5C48-B0F8-BA66CAE5CCC0}" type="datetimeFigureOut">
               <a:rPr lang="en-US" smtClean="0"/>
-              <a:t>12/13/18</a:t>
+              <a:t>12/14/18</a:t>
             </a:fld>
             <a:endParaRPr lang="en-US"/>
           </a:p>
@@ -3421,7 +3425,7 @@
         </p:blipFill>
         <p:spPr>
           <a:xfrm>
-            <a:off x="5179635" y="3697533"/>
+            <a:off x="5179635" y="3716386"/>
             <a:ext cx="5854700" cy="2146300"/>
           </a:xfrm>
           <a:prstGeom prst="rect">
@@ -3593,6 +3597,665 @@
     <p:extLst>
       <p:ext uri="{BB962C8B-B14F-4D97-AF65-F5344CB8AC3E}">
         <p14:creationId xmlns:p14="http://schemas.microsoft.com/office/powerpoint/2010/main" val="1882988077"/>
+      </p:ext>
+    </p:extLst>
+  </p:cSld>
+  <p:clrMapOvr>
+    <a:masterClrMapping/>
+  </p:clrMapOvr>
+</p:sld>
+</file>
+
+<file path=ppt/slides/slide11.xml><?xml version="1.0" encoding="utf-8"?>
+<p:sld xmlns:a="http://schemas.openxmlformats.org/drawingml/2006/main" xmlns:r="http://schemas.openxmlformats.org/officeDocument/2006/relationships" xmlns:p="http://schemas.openxmlformats.org/presentationml/2006/main">
+  <p:cSld>
+    <p:spTree>
+      <p:nvGrpSpPr>
+        <p:cNvPr id="1" name=""/>
+        <p:cNvGrpSpPr/>
+        <p:nvPr/>
+      </p:nvGrpSpPr>
+      <p:grpSpPr>
+        <a:xfrm>
+          <a:off x="0" y="0"/>
+          <a:ext cx="0" cy="0"/>
+          <a:chOff x="0" y="0"/>
+          <a:chExt cx="0" cy="0"/>
+        </a:xfrm>
+      </p:grpSpPr>
+      <p:sp>
+        <p:nvSpPr>
+          <p:cNvPr id="3" name="TextBox 2"/>
+          <p:cNvSpPr txBox="1"/>
+          <p:nvPr/>
+        </p:nvSpPr>
+        <p:spPr>
+          <a:xfrm>
+            <a:off x="697583" y="622168"/>
+            <a:ext cx="7929415" cy="369332"/>
+          </a:xfrm>
+          <a:prstGeom prst="rect">
+            <a:avLst/>
+          </a:prstGeom>
+          <a:noFill/>
+        </p:spPr>
+        <p:txBody>
+          <a:bodyPr wrap="none" rtlCol="0">
+            <a:spAutoFit/>
+          </a:bodyPr>
+          <a:lstStyle/>
+          <a:p>
+            <a:r>
+              <a:rPr lang="en-US" dirty="0" smtClean="0"/>
+              <a:t>Examined how scores vary with the number of features with the highest frequency</a:t>
+            </a:r>
+            <a:endParaRPr lang="en-US" dirty="0"/>
+          </a:p>
+        </p:txBody>
+      </p:sp>
+      <p:pic>
+        <p:nvPicPr>
+          <p:cNvPr id="4" name="Picture 3"/>
+          <p:cNvPicPr>
+            <a:picLocks noChangeAspect="1"/>
+          </p:cNvPicPr>
+          <p:nvPr/>
+        </p:nvPicPr>
+        <p:blipFill>
+          <a:blip r:embed="rId2">
+            <a:extLst>
+              <a:ext uri="{28A0092B-C50C-407E-A947-70E740481C1C}">
+                <a14:useLocalDpi xmlns:a14="http://schemas.microsoft.com/office/drawing/2010/main" val="0"/>
+              </a:ext>
+            </a:extLst>
+          </a:blip>
+          <a:stretch>
+            <a:fillRect/>
+          </a:stretch>
+        </p:blipFill>
+        <p:spPr>
+          <a:xfrm>
+            <a:off x="1762812" y="1365467"/>
+            <a:ext cx="8676826" cy="4532670"/>
+          </a:xfrm>
+          <a:prstGeom prst="rect">
+            <a:avLst/>
+          </a:prstGeom>
+        </p:spPr>
+      </p:pic>
+      <p:sp>
+        <p:nvSpPr>
+          <p:cNvPr id="5" name="TextBox 4"/>
+          <p:cNvSpPr txBox="1"/>
+          <p:nvPr/>
+        </p:nvSpPr>
+        <p:spPr>
+          <a:xfrm>
+            <a:off x="9579168" y="3114899"/>
+            <a:ext cx="2229987" cy="1477328"/>
+          </a:xfrm>
+          <a:prstGeom prst="rect">
+            <a:avLst/>
+          </a:prstGeom>
+          <a:noFill/>
+        </p:spPr>
+        <p:txBody>
+          <a:bodyPr wrap="square" rtlCol="0">
+            <a:spAutoFit/>
+          </a:bodyPr>
+          <a:lstStyle/>
+          <a:p>
+            <a:r>
+              <a:rPr lang="en-US" dirty="0" smtClean="0"/>
+              <a:t>Recall looks like it’s still going up</a:t>
+            </a:r>
+            <a:r>
+              <a:rPr lang="mr-IN" dirty="0" smtClean="0"/>
+              <a:t>…</a:t>
+            </a:r>
+            <a:endParaRPr lang="en-US" dirty="0" smtClean="0"/>
+          </a:p>
+          <a:p>
+            <a:endParaRPr lang="en-US" dirty="0"/>
+          </a:p>
+          <a:p>
+            <a:r>
+              <a:rPr lang="en-US" dirty="0" smtClean="0"/>
+              <a:t>Try a few more iterations</a:t>
+            </a:r>
+            <a:endParaRPr lang="en-US" dirty="0"/>
+          </a:p>
+        </p:txBody>
+      </p:sp>
+    </p:spTree>
+    <p:extLst>
+      <p:ext uri="{BB962C8B-B14F-4D97-AF65-F5344CB8AC3E}">
+        <p14:creationId xmlns:p14="http://schemas.microsoft.com/office/powerpoint/2010/main" val="1202070938"/>
+      </p:ext>
+    </p:extLst>
+  </p:cSld>
+  <p:clrMapOvr>
+    <a:masterClrMapping/>
+  </p:clrMapOvr>
+</p:sld>
+</file>
+
+<file path=ppt/slides/slide12.xml><?xml version="1.0" encoding="utf-8"?>
+<p:sld xmlns:a="http://schemas.openxmlformats.org/drawingml/2006/main" xmlns:r="http://schemas.openxmlformats.org/officeDocument/2006/relationships" xmlns:p="http://schemas.openxmlformats.org/presentationml/2006/main">
+  <p:cSld>
+    <p:spTree>
+      <p:nvGrpSpPr>
+        <p:cNvPr id="1" name=""/>
+        <p:cNvGrpSpPr/>
+        <p:nvPr/>
+      </p:nvGrpSpPr>
+      <p:grpSpPr>
+        <a:xfrm>
+          <a:off x="0" y="0"/>
+          <a:ext cx="0" cy="0"/>
+          <a:chOff x="0" y="0"/>
+          <a:chExt cx="0" cy="0"/>
+        </a:xfrm>
+      </p:grpSpPr>
+      <p:pic>
+        <p:nvPicPr>
+          <p:cNvPr id="3" name="Picture 2"/>
+          <p:cNvPicPr>
+            <a:picLocks noChangeAspect="1"/>
+          </p:cNvPicPr>
+          <p:nvPr/>
+        </p:nvPicPr>
+        <p:blipFill>
+          <a:blip r:embed="rId2">
+            <a:extLst>
+              <a:ext uri="{28A0092B-C50C-407E-A947-70E740481C1C}">
+                <a14:useLocalDpi xmlns:a14="http://schemas.microsoft.com/office/drawing/2010/main" val="0"/>
+              </a:ext>
+            </a:extLst>
+          </a:blip>
+          <a:stretch>
+            <a:fillRect/>
+          </a:stretch>
+        </p:blipFill>
+        <p:spPr>
+          <a:xfrm>
+            <a:off x="619432" y="744532"/>
+            <a:ext cx="9291484" cy="4868054"/>
+          </a:xfrm>
+          <a:prstGeom prst="rect">
+            <a:avLst/>
+          </a:prstGeom>
+        </p:spPr>
+      </p:pic>
+      <p:sp>
+        <p:nvSpPr>
+          <p:cNvPr id="4" name="TextBox 3"/>
+          <p:cNvSpPr txBox="1"/>
+          <p:nvPr/>
+        </p:nvSpPr>
+        <p:spPr>
+          <a:xfrm>
+            <a:off x="9577634" y="2820339"/>
+            <a:ext cx="2290713" cy="1200329"/>
+          </a:xfrm>
+          <a:prstGeom prst="rect">
+            <a:avLst/>
+          </a:prstGeom>
+          <a:noFill/>
+        </p:spPr>
+        <p:txBody>
+          <a:bodyPr wrap="square" rtlCol="0">
+            <a:spAutoFit/>
+          </a:bodyPr>
+          <a:lstStyle/>
+          <a:p>
+            <a:r>
+              <a:rPr lang="en-US" dirty="0" smtClean="0"/>
+              <a:t>Doesn’t look like </a:t>
+            </a:r>
+            <a:r>
+              <a:rPr lang="en-US" smtClean="0"/>
+              <a:t>it’s improving much by increasing the number of features. </a:t>
+            </a:r>
+            <a:endParaRPr lang="en-US"/>
+          </a:p>
+        </p:txBody>
+      </p:sp>
+      <p:sp>
+        <p:nvSpPr>
+          <p:cNvPr id="5" name="TextBox 4"/>
+          <p:cNvSpPr txBox="1"/>
+          <p:nvPr/>
+        </p:nvSpPr>
+        <p:spPr>
+          <a:xfrm>
+            <a:off x="3808430" y="5961037"/>
+            <a:ext cx="5016632" cy="646331"/>
+          </a:xfrm>
+          <a:prstGeom prst="rect">
+            <a:avLst/>
+          </a:prstGeom>
+          <a:noFill/>
+        </p:spPr>
+        <p:txBody>
+          <a:bodyPr wrap="square" rtlCol="0">
+            <a:spAutoFit/>
+          </a:bodyPr>
+          <a:lstStyle/>
+          <a:p>
+            <a:r>
+              <a:rPr lang="en-US" dirty="0" smtClean="0"/>
+              <a:t>At this point, 3000 </a:t>
+            </a:r>
+            <a:r>
+              <a:rPr lang="en-US" smtClean="0"/>
+              <a:t>features seems to be the best without doing anything else to the model.</a:t>
+            </a:r>
+            <a:endParaRPr lang="en-US" dirty="0"/>
+          </a:p>
+        </p:txBody>
+      </p:sp>
+    </p:spTree>
+    <p:extLst>
+      <p:ext uri="{BB962C8B-B14F-4D97-AF65-F5344CB8AC3E}">
+        <p14:creationId xmlns:p14="http://schemas.microsoft.com/office/powerpoint/2010/main" val="1214095375"/>
+      </p:ext>
+    </p:extLst>
+  </p:cSld>
+  <p:clrMapOvr>
+    <a:masterClrMapping/>
+  </p:clrMapOvr>
+</p:sld>
+</file>
+
+<file path=ppt/slides/slide13.xml><?xml version="1.0" encoding="utf-8"?>
+<p:sld xmlns:a="http://schemas.openxmlformats.org/drawingml/2006/main" xmlns:r="http://schemas.openxmlformats.org/officeDocument/2006/relationships" xmlns:p="http://schemas.openxmlformats.org/presentationml/2006/main">
+  <p:cSld>
+    <p:spTree>
+      <p:nvGrpSpPr>
+        <p:cNvPr id="1" name=""/>
+        <p:cNvGrpSpPr/>
+        <p:nvPr/>
+      </p:nvGrpSpPr>
+      <p:grpSpPr>
+        <a:xfrm>
+          <a:off x="0" y="0"/>
+          <a:ext cx="0" cy="0"/>
+          <a:chOff x="0" y="0"/>
+          <a:chExt cx="0" cy="0"/>
+        </a:xfrm>
+      </p:grpSpPr>
+      <p:sp>
+        <p:nvSpPr>
+          <p:cNvPr id="2" name="TextBox 1"/>
+          <p:cNvSpPr txBox="1"/>
+          <p:nvPr/>
+        </p:nvSpPr>
+        <p:spPr>
+          <a:xfrm>
+            <a:off x="1035169" y="534837"/>
+            <a:ext cx="1374222" cy="369332"/>
+          </a:xfrm>
+          <a:prstGeom prst="rect">
+            <a:avLst/>
+          </a:prstGeom>
+          <a:noFill/>
+        </p:spPr>
+        <p:txBody>
+          <a:bodyPr wrap="none" rtlCol="0">
+            <a:spAutoFit/>
+          </a:bodyPr>
+          <a:lstStyle/>
+          <a:p>
+            <a:r>
+              <a:rPr lang="en-US" smtClean="0"/>
+              <a:t>EC2 Instance</a:t>
+            </a:r>
+            <a:endParaRPr lang="en-US"/>
+          </a:p>
+        </p:txBody>
+      </p:sp>
+      <p:pic>
+        <p:nvPicPr>
+          <p:cNvPr id="3" name="Picture 2"/>
+          <p:cNvPicPr>
+            <a:picLocks noChangeAspect="1"/>
+          </p:cNvPicPr>
+          <p:nvPr/>
+        </p:nvPicPr>
+        <p:blipFill>
+          <a:blip r:embed="rId2">
+            <a:extLst>
+              <a:ext uri="{28A0092B-C50C-407E-A947-70E740481C1C}">
+                <a14:useLocalDpi xmlns:a14="http://schemas.microsoft.com/office/drawing/2010/main" val="0"/>
+              </a:ext>
+            </a:extLst>
+          </a:blip>
+          <a:stretch>
+            <a:fillRect/>
+          </a:stretch>
+        </p:blipFill>
+        <p:spPr>
+          <a:xfrm>
+            <a:off x="683581" y="1840637"/>
+            <a:ext cx="10813002" cy="2287366"/>
+          </a:xfrm>
+          <a:prstGeom prst="rect">
+            <a:avLst/>
+          </a:prstGeom>
+        </p:spPr>
+      </p:pic>
+    </p:spTree>
+    <p:extLst>
+      <p:ext uri="{BB962C8B-B14F-4D97-AF65-F5344CB8AC3E}">
+        <p14:creationId xmlns:p14="http://schemas.microsoft.com/office/powerpoint/2010/main" val="457337499"/>
+      </p:ext>
+    </p:extLst>
+  </p:cSld>
+  <p:clrMapOvr>
+    <a:masterClrMapping/>
+  </p:clrMapOvr>
+</p:sld>
+</file>
+
+<file path=ppt/slides/slide14.xml><?xml version="1.0" encoding="utf-8"?>
+<p:sld xmlns:a="http://schemas.openxmlformats.org/drawingml/2006/main" xmlns:r="http://schemas.openxmlformats.org/officeDocument/2006/relationships" xmlns:p="http://schemas.openxmlformats.org/presentationml/2006/main">
+  <p:cSld>
+    <p:spTree>
+      <p:nvGrpSpPr>
+        <p:cNvPr id="1" name=""/>
+        <p:cNvGrpSpPr/>
+        <p:nvPr/>
+      </p:nvGrpSpPr>
+      <p:grpSpPr>
+        <a:xfrm>
+          <a:off x="0" y="0"/>
+          <a:ext cx="0" cy="0"/>
+          <a:chOff x="0" y="0"/>
+          <a:chExt cx="0" cy="0"/>
+        </a:xfrm>
+      </p:grpSpPr>
+      <p:sp>
+        <p:nvSpPr>
+          <p:cNvPr id="2" name="TextBox 1"/>
+          <p:cNvSpPr txBox="1"/>
+          <p:nvPr/>
+        </p:nvSpPr>
+        <p:spPr>
+          <a:xfrm>
+            <a:off x="785004" y="422694"/>
+            <a:ext cx="1374222" cy="369332"/>
+          </a:xfrm>
+          <a:prstGeom prst="rect">
+            <a:avLst/>
+          </a:prstGeom>
+          <a:noFill/>
+        </p:spPr>
+        <p:txBody>
+          <a:bodyPr wrap="none" rtlCol="0">
+            <a:spAutoFit/>
+          </a:bodyPr>
+          <a:lstStyle/>
+          <a:p>
+            <a:r>
+              <a:rPr lang="en-US" smtClean="0"/>
+              <a:t>EC2 Instance</a:t>
+            </a:r>
+          </a:p>
+        </p:txBody>
+      </p:sp>
+      <p:sp>
+        <p:nvSpPr>
+          <p:cNvPr id="3" name="TextBox 2"/>
+          <p:cNvSpPr txBox="1"/>
+          <p:nvPr/>
+        </p:nvSpPr>
+        <p:spPr>
+          <a:xfrm>
+            <a:off x="785004" y="1004011"/>
+            <a:ext cx="6826677" cy="1477328"/>
+          </a:xfrm>
+          <a:prstGeom prst="rect">
+            <a:avLst/>
+          </a:prstGeom>
+          <a:noFill/>
+        </p:spPr>
+        <p:txBody>
+          <a:bodyPr wrap="none" rtlCol="0">
+            <a:spAutoFit/>
+          </a:bodyPr>
+          <a:lstStyle/>
+          <a:p>
+            <a:r>
+              <a:rPr lang="en-US" dirty="0" smtClean="0"/>
+              <a:t>~/.</a:t>
+            </a:r>
+            <a:r>
+              <a:rPr lang="en-US" dirty="0" err="1" smtClean="0"/>
+              <a:t>ssh</a:t>
+            </a:r>
+            <a:r>
+              <a:rPr lang="en-US" dirty="0" smtClean="0"/>
+              <a:t>/</a:t>
+            </a:r>
+            <a:r>
+              <a:rPr lang="en-US" dirty="0" err="1" smtClean="0"/>
+              <a:t>config</a:t>
+            </a:r>
+            <a:endParaRPr lang="en-US" dirty="0" smtClean="0"/>
+          </a:p>
+          <a:p>
+            <a:r>
+              <a:rPr lang="en-US" dirty="0" smtClean="0"/>
+              <a:t>Host </a:t>
+            </a:r>
+            <a:r>
+              <a:rPr lang="en-US" dirty="0" err="1"/>
+              <a:t>galvanize_capstone</a:t>
+            </a:r>
+            <a:endParaRPr lang="en-US" dirty="0"/>
+          </a:p>
+          <a:p>
+            <a:pPr lvl="1"/>
+            <a:r>
+              <a:rPr lang="en-US" dirty="0" err="1"/>
+              <a:t>HostName</a:t>
+            </a:r>
+            <a:r>
+              <a:rPr lang="en-US" dirty="0"/>
+              <a:t> ec2-34-221-255-8.us-west-2.compute.amazonaws.com</a:t>
+            </a:r>
+          </a:p>
+          <a:p>
+            <a:pPr lvl="1"/>
+            <a:r>
+              <a:rPr lang="en-US" dirty="0"/>
+              <a:t>User </a:t>
+            </a:r>
+            <a:r>
+              <a:rPr lang="en-US" dirty="0" err="1"/>
+              <a:t>ubuntu</a:t>
+            </a:r>
+            <a:endParaRPr lang="en-US" dirty="0"/>
+          </a:p>
+          <a:p>
+            <a:pPr lvl="1"/>
+            <a:r>
+              <a:rPr lang="en-US" dirty="0" err="1"/>
+              <a:t>IdentityFile</a:t>
+            </a:r>
+            <a:r>
+              <a:rPr lang="en-US" dirty="0"/>
+              <a:t> ~/.</a:t>
+            </a:r>
+            <a:r>
+              <a:rPr lang="en-US" dirty="0" err="1" smtClean="0"/>
+              <a:t>ssh</a:t>
+            </a:r>
+            <a:r>
+              <a:rPr lang="en-US" dirty="0" smtClean="0"/>
+              <a:t>/</a:t>
+            </a:r>
+            <a:r>
+              <a:rPr lang="en-US" dirty="0" err="1" smtClean="0"/>
+              <a:t>galvanize_capstone.pem</a:t>
+            </a:r>
+            <a:endParaRPr lang="en-US" dirty="0" smtClean="0"/>
+          </a:p>
+        </p:txBody>
+      </p:sp>
+      <p:sp>
+        <p:nvSpPr>
+          <p:cNvPr id="4" name="TextBox 3"/>
+          <p:cNvSpPr txBox="1"/>
+          <p:nvPr/>
+        </p:nvSpPr>
+        <p:spPr>
+          <a:xfrm>
+            <a:off x="785004" y="2793917"/>
+            <a:ext cx="2375394" cy="369332"/>
+          </a:xfrm>
+          <a:prstGeom prst="rect">
+            <a:avLst/>
+          </a:prstGeom>
+          <a:noFill/>
+        </p:spPr>
+        <p:txBody>
+          <a:bodyPr wrap="none" rtlCol="0">
+            <a:spAutoFit/>
+          </a:bodyPr>
+          <a:lstStyle/>
+          <a:p>
+            <a:r>
+              <a:rPr lang="en-US" dirty="0" err="1" smtClean="0"/>
+              <a:t>Ssh</a:t>
+            </a:r>
+            <a:r>
+              <a:rPr lang="en-US" dirty="0" smtClean="0"/>
+              <a:t> </a:t>
+            </a:r>
+            <a:r>
+              <a:rPr lang="en-US" dirty="0" err="1" smtClean="0"/>
+              <a:t>galvanize_capstone</a:t>
+            </a:r>
+            <a:endParaRPr lang="en-US" dirty="0" smtClean="0"/>
+          </a:p>
+        </p:txBody>
+      </p:sp>
+      <p:sp>
+        <p:nvSpPr>
+          <p:cNvPr id="5" name="TextBox 4"/>
+          <p:cNvSpPr txBox="1"/>
+          <p:nvPr/>
+        </p:nvSpPr>
+        <p:spPr>
+          <a:xfrm>
+            <a:off x="799994" y="3845159"/>
+            <a:ext cx="10622139" cy="1754326"/>
+          </a:xfrm>
+          <a:prstGeom prst="rect">
+            <a:avLst/>
+          </a:prstGeom>
+          <a:noFill/>
+        </p:spPr>
+        <p:txBody>
+          <a:bodyPr wrap="none" rtlCol="0">
+            <a:spAutoFit/>
+          </a:bodyPr>
+          <a:lstStyle/>
+          <a:p>
+            <a:r>
+              <a:rPr lang="en-US" dirty="0" err="1"/>
+              <a:t>sudo</a:t>
+            </a:r>
+            <a:r>
+              <a:rPr lang="en-US" dirty="0"/>
+              <a:t> apt update </a:t>
+            </a:r>
+            <a:endParaRPr lang="en-US" dirty="0" smtClean="0"/>
+          </a:p>
+          <a:p>
+            <a:r>
+              <a:rPr lang="en-US" dirty="0" err="1" smtClean="0"/>
+              <a:t>sudo</a:t>
+            </a:r>
+            <a:r>
+              <a:rPr lang="en-US" dirty="0" smtClean="0"/>
+              <a:t> </a:t>
+            </a:r>
+            <a:r>
+              <a:rPr lang="en-US" dirty="0"/>
+              <a:t>apt </a:t>
+            </a:r>
+            <a:r>
+              <a:rPr lang="en-US" dirty="0" smtClean="0"/>
+              <a:t>upgrade</a:t>
+            </a:r>
+          </a:p>
+          <a:p>
+            <a:endParaRPr lang="en-US" dirty="0"/>
+          </a:p>
+          <a:p>
+            <a:r>
+              <a:rPr lang="en-US" dirty="0" err="1"/>
+              <a:t>wget</a:t>
+            </a:r>
+            <a:r>
+              <a:rPr lang="en-US" dirty="0"/>
+              <a:t> -S -T 10 -t 5 https://</a:t>
+            </a:r>
+            <a:r>
+              <a:rPr lang="en-US" dirty="0" err="1" smtClean="0"/>
+              <a:t>repo.continuum.io</a:t>
+            </a:r>
+            <a:r>
+              <a:rPr lang="en-US" dirty="0" smtClean="0"/>
+              <a:t>/archive/</a:t>
+            </a:r>
+            <a:r>
+              <a:rPr lang="en-US" dirty="0">
+                <a:hlinkClick r:id="rId2"/>
+              </a:rPr>
+              <a:t>Anaconda3-5.3.1-Linux-x86_64.sh</a:t>
+            </a:r>
+            <a:r>
+              <a:rPr lang="en-US" dirty="0" smtClean="0"/>
+              <a:t> </a:t>
+            </a:r>
+            <a:r>
+              <a:rPr lang="en-US" dirty="0"/>
+              <a:t>-O $</a:t>
+            </a:r>
+            <a:r>
+              <a:rPr lang="en-US" dirty="0" smtClean="0"/>
+              <a:t>HOME/</a:t>
+            </a:r>
+            <a:r>
+              <a:rPr lang="en-US" dirty="0" err="1" smtClean="0"/>
+              <a:t>anaconda.sh</a:t>
+            </a:r>
+            <a:endParaRPr lang="en-US" dirty="0" smtClean="0"/>
+          </a:p>
+          <a:p>
+            <a:endParaRPr lang="en-US" dirty="0"/>
+          </a:p>
+          <a:p>
+            <a:r>
+              <a:rPr lang="en-US" dirty="0" smtClean="0"/>
+              <a:t>Source ~/.</a:t>
+            </a:r>
+            <a:r>
+              <a:rPr lang="en-US" smtClean="0"/>
+              <a:t>bashrc</a:t>
+            </a:r>
+            <a:endParaRPr lang="en-US" dirty="0" smtClean="0"/>
+          </a:p>
+        </p:txBody>
+      </p:sp>
+    </p:spTree>
+    <p:extLst>
+      <p:ext uri="{BB962C8B-B14F-4D97-AF65-F5344CB8AC3E}">
+        <p14:creationId xmlns:p14="http://schemas.microsoft.com/office/powerpoint/2010/main" val="953308987"/>
       </p:ext>
     </p:extLst>
   </p:cSld>

</xml_diff>

<commit_message>
modeled with tfidf and multinomial nb, exploration with max_features and alpha
</commit_message>
<xml_diff>
--- a/Galvanize Capstone Process.pptx
+++ b/Galvanize Capstone Process.pptx
@@ -5,7 +5,7 @@
     <p:sldMasterId id="2147483648" r:id="rId1"/>
   </p:sldMasterIdLst>
   <p:notesMasterIdLst>
-    <p:notesMasterId r:id="rId16"/>
+    <p:notesMasterId r:id="rId20"/>
   </p:notesMasterIdLst>
   <p:sldIdLst>
     <p:sldId id="256" r:id="rId2"/>
@@ -20,8 +20,12 @@
     <p:sldId id="266" r:id="rId11"/>
     <p:sldId id="269" r:id="rId12"/>
     <p:sldId id="270" r:id="rId13"/>
-    <p:sldId id="267" r:id="rId14"/>
-    <p:sldId id="268" r:id="rId15"/>
+    <p:sldId id="272" r:id="rId14"/>
+    <p:sldId id="274" r:id="rId15"/>
+    <p:sldId id="275" r:id="rId16"/>
+    <p:sldId id="271" r:id="rId17"/>
+    <p:sldId id="267" r:id="rId18"/>
+    <p:sldId id="268" r:id="rId19"/>
   </p:sldIdLst>
   <p:sldSz cx="12192000" cy="6858000"/>
   <p:notesSz cx="6858000" cy="9144000"/>
@@ -3885,16 +3889,46 @@
           <a:chExt cx="0" cy="0"/>
         </a:xfrm>
       </p:grpSpPr>
-      <p:sp>
-        <p:nvSpPr>
-          <p:cNvPr id="2" name="TextBox 1"/>
+      <p:pic>
+        <p:nvPicPr>
+          <p:cNvPr id="2" name="Picture 1"/>
+          <p:cNvPicPr>
+            <a:picLocks noChangeAspect="1"/>
+          </p:cNvPicPr>
+          <p:nvPr/>
+        </p:nvPicPr>
+        <p:blipFill>
+          <a:blip r:embed="rId2">
+            <a:extLst>
+              <a:ext uri="{28A0092B-C50C-407E-A947-70E740481C1C}">
+                <a14:useLocalDpi xmlns:a14="http://schemas.microsoft.com/office/drawing/2010/main" val="0"/>
+              </a:ext>
+            </a:extLst>
+          </a:blip>
+          <a:stretch>
+            <a:fillRect/>
+          </a:stretch>
+        </p:blipFill>
+        <p:spPr>
+          <a:xfrm>
+            <a:off x="685800" y="1355096"/>
+            <a:ext cx="9389853" cy="4893304"/>
+          </a:xfrm>
+          <a:prstGeom prst="rect">
+            <a:avLst/>
+          </a:prstGeom>
+        </p:spPr>
+      </p:pic>
+      <p:sp>
+        <p:nvSpPr>
+          <p:cNvPr id="4" name="TextBox 3"/>
           <p:cNvSpPr txBox="1"/>
           <p:nvPr/>
         </p:nvSpPr>
         <p:spPr>
           <a:xfrm>
-            <a:off x="1035169" y="534837"/>
-            <a:ext cx="1374222" cy="369332"/>
+            <a:off x="9577634" y="2820339"/>
+            <a:ext cx="2290713" cy="369332"/>
           </a:xfrm>
           <a:prstGeom prst="rect">
             <a:avLst/>
@@ -3902,19 +3936,79 @@
           <a:noFill/>
         </p:spPr>
         <p:txBody>
-          <a:bodyPr wrap="none" rtlCol="0">
+          <a:bodyPr wrap="square" rtlCol="0">
             <a:spAutoFit/>
           </a:bodyPr>
           <a:lstStyle/>
           <a:p>
             <a:r>
-              <a:rPr lang="en-US" smtClean="0"/>
-              <a:t>EC2 Instance</a:t>
-            </a:r>
-            <a:endParaRPr lang="en-US"/>
-          </a:p>
-        </p:txBody>
-      </p:sp>
+              <a:rPr lang="en-US" dirty="0" smtClean="0"/>
+              <a:t>Alpha = 5</a:t>
+            </a:r>
+            <a:endParaRPr lang="en-US" dirty="0"/>
+          </a:p>
+        </p:txBody>
+      </p:sp>
+      <p:sp>
+        <p:nvSpPr>
+          <p:cNvPr id="5" name="TextBox 4"/>
+          <p:cNvSpPr txBox="1"/>
+          <p:nvPr/>
+        </p:nvSpPr>
+        <p:spPr>
+          <a:xfrm>
+            <a:off x="2997723" y="6248400"/>
+            <a:ext cx="7211505" cy="369332"/>
+          </a:xfrm>
+          <a:prstGeom prst="rect">
+            <a:avLst/>
+          </a:prstGeom>
+          <a:noFill/>
+        </p:spPr>
+        <p:txBody>
+          <a:bodyPr wrap="square" rtlCol="0">
+            <a:spAutoFit/>
+          </a:bodyPr>
+          <a:lstStyle/>
+          <a:p>
+            <a:r>
+              <a:rPr lang="en-US" dirty="0" smtClean="0"/>
+              <a:t>Recall maxes out at 800 features, but is only at around 3.5</a:t>
+            </a:r>
+            <a:endParaRPr lang="en-US" dirty="0"/>
+          </a:p>
+        </p:txBody>
+      </p:sp>
+    </p:spTree>
+    <p:extLst>
+      <p:ext uri="{BB962C8B-B14F-4D97-AF65-F5344CB8AC3E}">
+        <p14:creationId xmlns:p14="http://schemas.microsoft.com/office/powerpoint/2010/main" val="959543775"/>
+      </p:ext>
+    </p:extLst>
+  </p:cSld>
+  <p:clrMapOvr>
+    <a:masterClrMapping/>
+  </p:clrMapOvr>
+</p:sld>
+</file>
+
+<file path=ppt/slides/slide14.xml><?xml version="1.0" encoding="utf-8"?>
+<p:sld xmlns:a="http://schemas.openxmlformats.org/drawingml/2006/main" xmlns:r="http://schemas.openxmlformats.org/officeDocument/2006/relationships" xmlns:p="http://schemas.openxmlformats.org/presentationml/2006/main">
+  <p:cSld>
+    <p:spTree>
+      <p:nvGrpSpPr>
+        <p:cNvPr id="1" name=""/>
+        <p:cNvGrpSpPr/>
+        <p:nvPr/>
+      </p:nvGrpSpPr>
+      <p:grpSpPr>
+        <a:xfrm>
+          <a:off x="0" y="0"/>
+          <a:ext cx="0" cy="0"/>
+          <a:chOff x="0" y="0"/>
+          <a:chExt cx="0" cy="0"/>
+        </a:xfrm>
+      </p:grpSpPr>
       <p:pic>
         <p:nvPicPr>
           <p:cNvPr id="3" name="Picture 2"/>
@@ -3937,6 +4031,326 @@
         </p:blipFill>
         <p:spPr>
           <a:xfrm>
+            <a:off x="719971" y="541721"/>
+            <a:ext cx="10287000" cy="5295900"/>
+          </a:xfrm>
+          <a:prstGeom prst="rect">
+            <a:avLst/>
+          </a:prstGeom>
+        </p:spPr>
+      </p:pic>
+      <p:sp>
+        <p:nvSpPr>
+          <p:cNvPr id="4" name="TextBox 3"/>
+          <p:cNvSpPr txBox="1"/>
+          <p:nvPr/>
+        </p:nvSpPr>
+        <p:spPr>
+          <a:xfrm>
+            <a:off x="2356702" y="2283011"/>
+            <a:ext cx="4788816" cy="646331"/>
+          </a:xfrm>
+          <a:prstGeom prst="rect">
+            <a:avLst/>
+          </a:prstGeom>
+          <a:noFill/>
+        </p:spPr>
+        <p:txBody>
+          <a:bodyPr wrap="square" rtlCol="0">
+            <a:spAutoFit/>
+          </a:bodyPr>
+          <a:lstStyle/>
+          <a:p>
+            <a:r>
+              <a:rPr lang="en-US" dirty="0" smtClean="0"/>
+              <a:t>Our recall almost reaches .51 </a:t>
+            </a:r>
+            <a:r>
+              <a:rPr lang="en-US" smtClean="0"/>
+              <a:t>when alpha is between .3 and .4</a:t>
+            </a:r>
+            <a:endParaRPr lang="en-US" dirty="0"/>
+          </a:p>
+        </p:txBody>
+      </p:sp>
+      <p:sp>
+        <p:nvSpPr>
+          <p:cNvPr id="5" name="TextBox 4"/>
+          <p:cNvSpPr txBox="1"/>
+          <p:nvPr/>
+        </p:nvSpPr>
+        <p:spPr>
+          <a:xfrm>
+            <a:off x="2997723" y="6248400"/>
+            <a:ext cx="7211505" cy="369332"/>
+          </a:xfrm>
+          <a:prstGeom prst="rect">
+            <a:avLst/>
+          </a:prstGeom>
+          <a:noFill/>
+        </p:spPr>
+        <p:txBody>
+          <a:bodyPr wrap="square" rtlCol="0">
+            <a:spAutoFit/>
+          </a:bodyPr>
+          <a:lstStyle/>
+          <a:p>
+            <a:r>
+              <a:rPr lang="en-US" dirty="0" smtClean="0"/>
+              <a:t>Let’s up the features</a:t>
+            </a:r>
+            <a:r>
+              <a:rPr lang="mr-IN" dirty="0" smtClean="0"/>
+              <a:t>…</a:t>
+            </a:r>
+            <a:endParaRPr lang="en-US" dirty="0"/>
+          </a:p>
+        </p:txBody>
+      </p:sp>
+    </p:spTree>
+    <p:extLst>
+      <p:ext uri="{BB962C8B-B14F-4D97-AF65-F5344CB8AC3E}">
+        <p14:creationId xmlns:p14="http://schemas.microsoft.com/office/powerpoint/2010/main" val="212749885"/>
+      </p:ext>
+    </p:extLst>
+  </p:cSld>
+  <p:clrMapOvr>
+    <a:masterClrMapping/>
+  </p:clrMapOvr>
+</p:sld>
+</file>
+
+<file path=ppt/slides/slide15.xml><?xml version="1.0" encoding="utf-8"?>
+<p:sld xmlns:a="http://schemas.openxmlformats.org/drawingml/2006/main" xmlns:r="http://schemas.openxmlformats.org/officeDocument/2006/relationships" xmlns:p="http://schemas.openxmlformats.org/presentationml/2006/main">
+  <p:cSld>
+    <p:spTree>
+      <p:nvGrpSpPr>
+        <p:cNvPr id="1" name=""/>
+        <p:cNvGrpSpPr/>
+        <p:nvPr/>
+      </p:nvGrpSpPr>
+      <p:grpSpPr>
+        <a:xfrm>
+          <a:off x="0" y="0"/>
+          <a:ext cx="0" cy="0"/>
+          <a:chOff x="0" y="0"/>
+          <a:chExt cx="0" cy="0"/>
+        </a:xfrm>
+      </p:grpSpPr>
+      <p:pic>
+        <p:nvPicPr>
+          <p:cNvPr id="2" name="Picture 1"/>
+          <p:cNvPicPr>
+            <a:picLocks noChangeAspect="1"/>
+          </p:cNvPicPr>
+          <p:nvPr/>
+        </p:nvPicPr>
+        <p:blipFill>
+          <a:blip r:embed="rId2">
+            <a:extLst>
+              <a:ext uri="{28A0092B-C50C-407E-A947-70E740481C1C}">
+                <a14:useLocalDpi xmlns:a14="http://schemas.microsoft.com/office/drawing/2010/main" val="0"/>
+              </a:ext>
+            </a:extLst>
+          </a:blip>
+          <a:stretch>
+            <a:fillRect/>
+          </a:stretch>
+        </p:blipFill>
+        <p:spPr>
+          <a:xfrm>
+            <a:off x="927100" y="762000"/>
+            <a:ext cx="10325100" cy="5321300"/>
+          </a:xfrm>
+          <a:prstGeom prst="rect">
+            <a:avLst/>
+          </a:prstGeom>
+        </p:spPr>
+      </p:pic>
+      <p:sp>
+        <p:nvSpPr>
+          <p:cNvPr id="4" name="TextBox 3"/>
+          <p:cNvSpPr txBox="1"/>
+          <p:nvPr/>
+        </p:nvSpPr>
+        <p:spPr>
+          <a:xfrm>
+            <a:off x="1451729" y="2509254"/>
+            <a:ext cx="4176073" cy="646331"/>
+          </a:xfrm>
+          <a:prstGeom prst="rect">
+            <a:avLst/>
+          </a:prstGeom>
+          <a:noFill/>
+        </p:spPr>
+        <p:txBody>
+          <a:bodyPr wrap="square" rtlCol="0">
+            <a:spAutoFit/>
+          </a:bodyPr>
+          <a:lstStyle/>
+          <a:p>
+            <a:r>
+              <a:rPr lang="en-US" dirty="0" smtClean="0"/>
+              <a:t>At 5000 features, alpha = 1.5 </a:t>
+            </a:r>
+            <a:r>
+              <a:rPr lang="mr-IN" dirty="0" smtClean="0"/>
+              <a:t>–</a:t>
+            </a:r>
+            <a:r>
+              <a:rPr lang="en-US" dirty="0" smtClean="0"/>
+              <a:t> 2 gives the best recall.</a:t>
+            </a:r>
+            <a:endParaRPr lang="en-US" dirty="0"/>
+          </a:p>
+        </p:txBody>
+      </p:sp>
+      <p:sp>
+        <p:nvSpPr>
+          <p:cNvPr id="5" name="TextBox 4"/>
+          <p:cNvSpPr txBox="1"/>
+          <p:nvPr/>
+        </p:nvSpPr>
+        <p:spPr>
+          <a:xfrm>
+            <a:off x="2997723" y="6248400"/>
+            <a:ext cx="7211505" cy="369332"/>
+          </a:xfrm>
+          <a:prstGeom prst="rect">
+            <a:avLst/>
+          </a:prstGeom>
+          <a:noFill/>
+        </p:spPr>
+        <p:txBody>
+          <a:bodyPr wrap="square" rtlCol="0">
+            <a:spAutoFit/>
+          </a:bodyPr>
+          <a:lstStyle/>
+          <a:p>
+            <a:r>
+              <a:rPr lang="mr-IN" dirty="0" smtClean="0"/>
+              <a:t>…</a:t>
+            </a:r>
+            <a:r>
+              <a:rPr lang="en-US" dirty="0" smtClean="0"/>
+              <a:t> splitting hairs at this point. Time to try some other approaches.</a:t>
+            </a:r>
+            <a:endParaRPr lang="en-US" dirty="0"/>
+          </a:p>
+        </p:txBody>
+      </p:sp>
+    </p:spTree>
+    <p:extLst>
+      <p:ext uri="{BB962C8B-B14F-4D97-AF65-F5344CB8AC3E}">
+        <p14:creationId xmlns:p14="http://schemas.microsoft.com/office/powerpoint/2010/main" val="1428149175"/>
+      </p:ext>
+    </p:extLst>
+  </p:cSld>
+  <p:clrMapOvr>
+    <a:masterClrMapping/>
+  </p:clrMapOvr>
+</p:sld>
+</file>
+
+<file path=ppt/slides/slide16.xml><?xml version="1.0" encoding="utf-8"?>
+<p:sld xmlns:a="http://schemas.openxmlformats.org/drawingml/2006/main" xmlns:r="http://schemas.openxmlformats.org/officeDocument/2006/relationships" xmlns:p="http://schemas.openxmlformats.org/presentationml/2006/main">
+  <p:cSld>
+    <p:spTree>
+      <p:nvGrpSpPr>
+        <p:cNvPr id="1" name=""/>
+        <p:cNvGrpSpPr/>
+        <p:nvPr/>
+      </p:nvGrpSpPr>
+      <p:grpSpPr>
+        <a:xfrm>
+          <a:off x="0" y="0"/>
+          <a:ext cx="0" cy="0"/>
+          <a:chOff x="0" y="0"/>
+          <a:chExt cx="0" cy="0"/>
+        </a:xfrm>
+      </p:grpSpPr>
+    </p:spTree>
+    <p:extLst>
+      <p:ext uri="{BB962C8B-B14F-4D97-AF65-F5344CB8AC3E}">
+        <p14:creationId xmlns:p14="http://schemas.microsoft.com/office/powerpoint/2010/main" val="149296153"/>
+      </p:ext>
+    </p:extLst>
+  </p:cSld>
+  <p:clrMapOvr>
+    <a:masterClrMapping/>
+  </p:clrMapOvr>
+</p:sld>
+</file>
+
+<file path=ppt/slides/slide17.xml><?xml version="1.0" encoding="utf-8"?>
+<p:sld xmlns:a="http://schemas.openxmlformats.org/drawingml/2006/main" xmlns:r="http://schemas.openxmlformats.org/officeDocument/2006/relationships" xmlns:p="http://schemas.openxmlformats.org/presentationml/2006/main">
+  <p:cSld>
+    <p:spTree>
+      <p:nvGrpSpPr>
+        <p:cNvPr id="1" name=""/>
+        <p:cNvGrpSpPr/>
+        <p:nvPr/>
+      </p:nvGrpSpPr>
+      <p:grpSpPr>
+        <a:xfrm>
+          <a:off x="0" y="0"/>
+          <a:ext cx="0" cy="0"/>
+          <a:chOff x="0" y="0"/>
+          <a:chExt cx="0" cy="0"/>
+        </a:xfrm>
+      </p:grpSpPr>
+      <p:sp>
+        <p:nvSpPr>
+          <p:cNvPr id="2" name="TextBox 1"/>
+          <p:cNvSpPr txBox="1"/>
+          <p:nvPr/>
+        </p:nvSpPr>
+        <p:spPr>
+          <a:xfrm>
+            <a:off x="1035169" y="534837"/>
+            <a:ext cx="1374222" cy="369332"/>
+          </a:xfrm>
+          <a:prstGeom prst="rect">
+            <a:avLst/>
+          </a:prstGeom>
+          <a:noFill/>
+        </p:spPr>
+        <p:txBody>
+          <a:bodyPr wrap="none" rtlCol="0">
+            <a:spAutoFit/>
+          </a:bodyPr>
+          <a:lstStyle/>
+          <a:p>
+            <a:r>
+              <a:rPr lang="en-US" smtClean="0"/>
+              <a:t>EC2 Instance</a:t>
+            </a:r>
+            <a:endParaRPr lang="en-US"/>
+          </a:p>
+        </p:txBody>
+      </p:sp>
+      <p:pic>
+        <p:nvPicPr>
+          <p:cNvPr id="3" name="Picture 2"/>
+          <p:cNvPicPr>
+            <a:picLocks noChangeAspect="1"/>
+          </p:cNvPicPr>
+          <p:nvPr/>
+        </p:nvPicPr>
+        <p:blipFill>
+          <a:blip r:embed="rId2">
+            <a:extLst>
+              <a:ext uri="{28A0092B-C50C-407E-A947-70E740481C1C}">
+                <a14:useLocalDpi xmlns:a14="http://schemas.microsoft.com/office/drawing/2010/main" val="0"/>
+              </a:ext>
+            </a:extLst>
+          </a:blip>
+          <a:stretch>
+            <a:fillRect/>
+          </a:stretch>
+        </p:blipFill>
+        <p:spPr>
+          <a:xfrm>
             <a:off x="683581" y="1840637"/>
             <a:ext cx="10813002" cy="2287366"/>
           </a:xfrm>
@@ -3958,7 +4372,7 @@
 </p:sld>
 </file>
 
-<file path=ppt/slides/slide14.xml><?xml version="1.0" encoding="utf-8"?>
+<file path=ppt/slides/slide18.xml><?xml version="1.0" encoding="utf-8"?>
 <p:sld xmlns:a="http://schemas.openxmlformats.org/drawingml/2006/main" xmlns:r="http://schemas.openxmlformats.org/officeDocument/2006/relationships" xmlns:p="http://schemas.openxmlformats.org/presentationml/2006/main">
   <p:cSld>
     <p:spTree>

</xml_diff>

<commit_message>
added slides for finalizing nlp model
</commit_message>
<xml_diff>
--- a/Galvanize Capstone Process.pptx
+++ b/Galvanize Capstone Process.pptx
@@ -5,7 +5,7 @@
     <p:sldMasterId id="2147483648" r:id="rId1"/>
   </p:sldMasterIdLst>
   <p:notesMasterIdLst>
-    <p:notesMasterId r:id="rId21"/>
+    <p:notesMasterId r:id="rId32"/>
   </p:notesMasterIdLst>
   <p:sldIdLst>
     <p:sldId id="256" r:id="rId2"/>
@@ -25,8 +25,19 @@
     <p:sldId id="274" r:id="rId16"/>
     <p:sldId id="275" r:id="rId17"/>
     <p:sldId id="271" r:id="rId18"/>
-    <p:sldId id="267" r:id="rId19"/>
-    <p:sldId id="268" r:id="rId20"/>
+    <p:sldId id="287" r:id="rId19"/>
+    <p:sldId id="267" r:id="rId20"/>
+    <p:sldId id="268" r:id="rId21"/>
+    <p:sldId id="277" r:id="rId22"/>
+    <p:sldId id="278" r:id="rId23"/>
+    <p:sldId id="279" r:id="rId24"/>
+    <p:sldId id="280" r:id="rId25"/>
+    <p:sldId id="281" r:id="rId26"/>
+    <p:sldId id="282" r:id="rId27"/>
+    <p:sldId id="284" r:id="rId28"/>
+    <p:sldId id="283" r:id="rId29"/>
+    <p:sldId id="285" r:id="rId30"/>
+    <p:sldId id="286" r:id="rId31"/>
   </p:sldIdLst>
   <p:sldSz cx="12192000" cy="6858000"/>
   <p:notesSz cx="6858000" cy="9144000"/>
@@ -215,7 +226,7 @@
           <a:p>
             <a:fld id="{06A1DF3A-DE3A-344E-9DD6-13296F177B4B}" type="datetimeFigureOut">
               <a:rPr lang="en-US" smtClean="0"/>
-              <a:t>12/14/18</a:t>
+              <a:t>12/19/18</a:t>
             </a:fld>
             <a:endParaRPr lang="en-US"/>
           </a:p>
@@ -614,7 +625,7 @@
           <a:p>
             <a:fld id="{7ADDD86B-D938-5C48-B0F8-BA66CAE5CCC0}" type="datetimeFigureOut">
               <a:rPr lang="en-US" smtClean="0"/>
-              <a:t>12/14/18</a:t>
+              <a:t>12/19/18</a:t>
             </a:fld>
             <a:endParaRPr lang="en-US"/>
           </a:p>
@@ -784,7 +795,7 @@
           <a:p>
             <a:fld id="{7ADDD86B-D938-5C48-B0F8-BA66CAE5CCC0}" type="datetimeFigureOut">
               <a:rPr lang="en-US" smtClean="0"/>
-              <a:t>12/14/18</a:t>
+              <a:t>12/19/18</a:t>
             </a:fld>
             <a:endParaRPr lang="en-US"/>
           </a:p>
@@ -964,7 +975,7 @@
           <a:p>
             <a:fld id="{7ADDD86B-D938-5C48-B0F8-BA66CAE5CCC0}" type="datetimeFigureOut">
               <a:rPr lang="en-US" smtClean="0"/>
-              <a:t>12/14/18</a:t>
+              <a:t>12/19/18</a:t>
             </a:fld>
             <a:endParaRPr lang="en-US"/>
           </a:p>
@@ -1134,7 +1145,7 @@
           <a:p>
             <a:fld id="{7ADDD86B-D938-5C48-B0F8-BA66CAE5CCC0}" type="datetimeFigureOut">
               <a:rPr lang="en-US" smtClean="0"/>
-              <a:t>12/14/18</a:t>
+              <a:t>12/19/18</a:t>
             </a:fld>
             <a:endParaRPr lang="en-US"/>
           </a:p>
@@ -1380,7 +1391,7 @@
           <a:p>
             <a:fld id="{7ADDD86B-D938-5C48-B0F8-BA66CAE5CCC0}" type="datetimeFigureOut">
               <a:rPr lang="en-US" smtClean="0"/>
-              <a:t>12/14/18</a:t>
+              <a:t>12/19/18</a:t>
             </a:fld>
             <a:endParaRPr lang="en-US"/>
           </a:p>
@@ -1612,7 +1623,7 @@
           <a:p>
             <a:fld id="{7ADDD86B-D938-5C48-B0F8-BA66CAE5CCC0}" type="datetimeFigureOut">
               <a:rPr lang="en-US" smtClean="0"/>
-              <a:t>12/14/18</a:t>
+              <a:t>12/19/18</a:t>
             </a:fld>
             <a:endParaRPr lang="en-US"/>
           </a:p>
@@ -1979,7 +1990,7 @@
           <a:p>
             <a:fld id="{7ADDD86B-D938-5C48-B0F8-BA66CAE5CCC0}" type="datetimeFigureOut">
               <a:rPr lang="en-US" smtClean="0"/>
-              <a:t>12/14/18</a:t>
+              <a:t>12/19/18</a:t>
             </a:fld>
             <a:endParaRPr lang="en-US"/>
           </a:p>
@@ -2097,7 +2108,7 @@
           <a:p>
             <a:fld id="{7ADDD86B-D938-5C48-B0F8-BA66CAE5CCC0}" type="datetimeFigureOut">
               <a:rPr lang="en-US" smtClean="0"/>
-              <a:t>12/14/18</a:t>
+              <a:t>12/19/18</a:t>
             </a:fld>
             <a:endParaRPr lang="en-US"/>
           </a:p>
@@ -2192,7 +2203,7 @@
           <a:p>
             <a:fld id="{7ADDD86B-D938-5C48-B0F8-BA66CAE5CCC0}" type="datetimeFigureOut">
               <a:rPr lang="en-US" smtClean="0"/>
-              <a:t>12/14/18</a:t>
+              <a:t>12/19/18</a:t>
             </a:fld>
             <a:endParaRPr lang="en-US"/>
           </a:p>
@@ -2469,7 +2480,7 @@
           <a:p>
             <a:fld id="{7ADDD86B-D938-5C48-B0F8-BA66CAE5CCC0}" type="datetimeFigureOut">
               <a:rPr lang="en-US" smtClean="0"/>
-              <a:t>12/14/18</a:t>
+              <a:t>12/19/18</a:t>
             </a:fld>
             <a:endParaRPr lang="en-US"/>
           </a:p>
@@ -2722,7 +2733,7 @@
           <a:p>
             <a:fld id="{7ADDD86B-D938-5C48-B0F8-BA66CAE5CCC0}" type="datetimeFigureOut">
               <a:rPr lang="en-US" smtClean="0"/>
-              <a:t>12/14/18</a:t>
+              <a:t>12/19/18</a:t>
             </a:fld>
             <a:endParaRPr lang="en-US"/>
           </a:p>
@@ -2935,7 +2946,7 @@
           <a:p>
             <a:fld id="{7ADDD86B-D938-5C48-B0F8-BA66CAE5CCC0}" type="datetimeFigureOut">
               <a:rPr lang="en-US" smtClean="0"/>
-              <a:t>12/14/18</a:t>
+              <a:t>12/19/18</a:t>
             </a:fld>
             <a:endParaRPr lang="en-US"/>
           </a:p>
@@ -3355,7 +3366,7 @@
           <a:bodyPr/>
           <a:lstStyle/>
           <a:p>
-            <a:endParaRPr lang="en-US"/>
+            <a:endParaRPr lang="en-US" dirty="0"/>
           </a:p>
         </p:txBody>
       </p:sp>
@@ -4369,6 +4380,96 @@
           <a:chExt cx="0" cy="0"/>
         </a:xfrm>
       </p:grpSpPr>
+      <p:pic>
+        <p:nvPicPr>
+          <p:cNvPr id="2" name="Picture 1"/>
+          <p:cNvPicPr>
+            <a:picLocks noChangeAspect="1"/>
+          </p:cNvPicPr>
+          <p:nvPr/>
+        </p:nvPicPr>
+        <p:blipFill>
+          <a:blip r:embed="rId2">
+            <a:extLst>
+              <a:ext uri="{28A0092B-C50C-407E-A947-70E740481C1C}">
+                <a14:useLocalDpi xmlns:a14="http://schemas.microsoft.com/office/drawing/2010/main" val="0"/>
+              </a:ext>
+            </a:extLst>
+          </a:blip>
+          <a:stretch>
+            <a:fillRect/>
+          </a:stretch>
+        </p:blipFill>
+        <p:spPr>
+          <a:xfrm>
+            <a:off x="4024310" y="1348033"/>
+            <a:ext cx="7806460" cy="3925740"/>
+          </a:xfrm>
+          <a:prstGeom prst="rect">
+            <a:avLst/>
+          </a:prstGeom>
+        </p:spPr>
+      </p:pic>
+      <p:sp>
+        <p:nvSpPr>
+          <p:cNvPr id="3" name="TextBox 2"/>
+          <p:cNvSpPr txBox="1"/>
+          <p:nvPr/>
+        </p:nvSpPr>
+        <p:spPr>
+          <a:xfrm>
+            <a:off x="546755" y="2987737"/>
+            <a:ext cx="3477555" cy="646331"/>
+          </a:xfrm>
+          <a:prstGeom prst="rect">
+            <a:avLst/>
+          </a:prstGeom>
+          <a:noFill/>
+        </p:spPr>
+        <p:txBody>
+          <a:bodyPr wrap="square" rtlCol="0">
+            <a:spAutoFit/>
+          </a:bodyPr>
+          <a:lstStyle/>
+          <a:p>
+            <a:r>
+              <a:rPr lang="en-US" dirty="0" smtClean="0"/>
+              <a:t>With a stratified train-test split the best recall score is specified below.</a:t>
+            </a:r>
+            <a:endParaRPr lang="en-US" dirty="0"/>
+          </a:p>
+        </p:txBody>
+      </p:sp>
+      <p:pic>
+        <p:nvPicPr>
+          <p:cNvPr id="4" name="Picture 3"/>
+          <p:cNvPicPr>
+            <a:picLocks noChangeAspect="1"/>
+          </p:cNvPicPr>
+          <p:nvPr/>
+        </p:nvPicPr>
+        <p:blipFill>
+          <a:blip r:embed="rId3">
+            <a:extLst>
+              <a:ext uri="{28A0092B-C50C-407E-A947-70E740481C1C}">
+                <a14:useLocalDpi xmlns:a14="http://schemas.microsoft.com/office/drawing/2010/main" val="0"/>
+              </a:ext>
+            </a:extLst>
+          </a:blip>
+          <a:stretch>
+            <a:fillRect/>
+          </a:stretch>
+        </p:blipFill>
+        <p:spPr>
+          <a:xfrm>
+            <a:off x="959126" y="5451061"/>
+            <a:ext cx="10579100" cy="952500"/>
+          </a:xfrm>
+          <a:prstGeom prst="rect">
+            <a:avLst/>
+          </a:prstGeom>
+        </p:spPr>
+      </p:pic>
     </p:spTree>
     <p:extLst>
       <p:ext uri="{BB962C8B-B14F-4D97-AF65-F5344CB8AC3E}">
@@ -4401,14 +4502,14 @@
       </p:grpSpPr>
       <p:sp>
         <p:nvSpPr>
-          <p:cNvPr id="2" name="TextBox 1"/>
+          <p:cNvPr id="3" name="TextBox 2"/>
           <p:cNvSpPr txBox="1"/>
           <p:nvPr/>
         </p:nvSpPr>
         <p:spPr>
           <a:xfrm>
-            <a:off x="1035169" y="534837"/>
-            <a:ext cx="1374222" cy="369332"/>
+            <a:off x="546755" y="2987736"/>
+            <a:ext cx="2573517" cy="1200329"/>
           </a:xfrm>
           <a:prstGeom prst="rect">
             <a:avLst/>
@@ -4416,22 +4517,30 @@
           <a:noFill/>
         </p:spPr>
         <p:txBody>
-          <a:bodyPr wrap="none" rtlCol="0">
+          <a:bodyPr wrap="square" rtlCol="0">
             <a:spAutoFit/>
           </a:bodyPr>
           <a:lstStyle/>
           <a:p>
             <a:r>
-              <a:rPr lang="en-US" smtClean="0"/>
-              <a:t>EC2 Instance</a:t>
-            </a:r>
-            <a:endParaRPr lang="en-US"/>
+              <a:rPr lang="en-US" dirty="0" smtClean="0"/>
+              <a:t>Keeping </a:t>
+            </a:r>
+            <a:r>
+              <a:rPr lang="en-US" dirty="0" err="1" smtClean="0"/>
+              <a:t>max_features</a:t>
+            </a:r>
+            <a:r>
+              <a:rPr lang="en-US" dirty="0" smtClean="0"/>
+              <a:t> at 3250, dial in the alpha in the Multinomial Naïve Bayes model</a:t>
+            </a:r>
+            <a:endParaRPr lang="en-US" dirty="0"/>
           </a:p>
         </p:txBody>
       </p:sp>
       <p:pic>
         <p:nvPicPr>
-          <p:cNvPr id="3" name="Picture 2"/>
+          <p:cNvPr id="5" name="Picture 4"/>
           <p:cNvPicPr>
             <a:picLocks noChangeAspect="1"/>
           </p:cNvPicPr>
@@ -4451,8 +4560,8 @@
         </p:blipFill>
         <p:spPr>
           <a:xfrm>
-            <a:off x="683581" y="1840637"/>
-            <a:ext cx="10813002" cy="2287366"/>
+            <a:off x="3238615" y="1055801"/>
+            <a:ext cx="8696110" cy="4986779"/>
           </a:xfrm>
           <a:prstGeom prst="rect">
             <a:avLst/>
@@ -4462,7 +4571,7 @@
     </p:spTree>
     <p:extLst>
       <p:ext uri="{BB962C8B-B14F-4D97-AF65-F5344CB8AC3E}">
-        <p14:creationId xmlns:p14="http://schemas.microsoft.com/office/powerpoint/2010/main" val="457337499"/>
+        <p14:creationId xmlns:p14="http://schemas.microsoft.com/office/powerpoint/2010/main" val="1329833121"/>
       </p:ext>
     </p:extLst>
   </p:cSld>
@@ -4497,7 +4606,7 @@
         </p:nvSpPr>
         <p:spPr>
           <a:xfrm>
-            <a:off x="785004" y="422694"/>
+            <a:off x="1035169" y="534837"/>
             <a:ext cx="1374222" cy="369332"/>
           </a:xfrm>
           <a:prstGeom prst="rect">
@@ -4515,261 +4624,44 @@
               <a:rPr lang="en-US" smtClean="0"/>
               <a:t>EC2 Instance</a:t>
             </a:r>
-          </a:p>
-        </p:txBody>
-      </p:sp>
-      <p:sp>
-        <p:nvSpPr>
-          <p:cNvPr id="3" name="TextBox 2"/>
-          <p:cNvSpPr txBox="1"/>
-          <p:nvPr/>
-        </p:nvSpPr>
-        <p:spPr>
-          <a:xfrm>
-            <a:off x="785004" y="1004011"/>
-            <a:ext cx="6826677" cy="1477328"/>
-          </a:xfrm>
-          <a:prstGeom prst="rect">
-            <a:avLst/>
-          </a:prstGeom>
-          <a:noFill/>
-        </p:spPr>
-        <p:txBody>
-          <a:bodyPr wrap="none" rtlCol="0">
-            <a:spAutoFit/>
-          </a:bodyPr>
-          <a:lstStyle/>
-          <a:p>
-            <a:r>
-              <a:rPr lang="en-US" dirty="0" smtClean="0"/>
-              <a:t>~/.</a:t>
-            </a:r>
-            <a:r>
-              <a:rPr lang="en-US" dirty="0" err="1" smtClean="0"/>
-              <a:t>ssh</a:t>
-            </a:r>
-            <a:r>
-              <a:rPr lang="en-US" dirty="0" smtClean="0"/>
-              <a:t>/</a:t>
-            </a:r>
-            <a:r>
-              <a:rPr lang="en-US" dirty="0" err="1" smtClean="0"/>
-              <a:t>config</a:t>
-            </a:r>
-            <a:endParaRPr lang="en-US" dirty="0" smtClean="0"/>
-          </a:p>
-          <a:p>
-            <a:r>
-              <a:rPr lang="en-US" dirty="0" smtClean="0"/>
-              <a:t>Host </a:t>
-            </a:r>
-            <a:r>
-              <a:rPr lang="en-US" dirty="0" err="1"/>
-              <a:t>galvanize_capstone</a:t>
-            </a:r>
-            <a:endParaRPr lang="en-US" dirty="0"/>
-          </a:p>
-          <a:p>
-            <a:pPr lvl="1"/>
-            <a:r>
-              <a:rPr lang="en-US" dirty="0" err="1"/>
-              <a:t>HostName</a:t>
-            </a:r>
-            <a:r>
-              <a:rPr lang="en-US" dirty="0"/>
-              <a:t> ec2-34-221-255-8.us-west-2.compute.amazonaws.com</a:t>
-            </a:r>
-          </a:p>
-          <a:p>
-            <a:pPr lvl="1"/>
-            <a:r>
-              <a:rPr lang="en-US" dirty="0"/>
-              <a:t>User </a:t>
-            </a:r>
-            <a:r>
-              <a:rPr lang="en-US" dirty="0" err="1"/>
-              <a:t>ubuntu</a:t>
-            </a:r>
-            <a:endParaRPr lang="en-US" dirty="0"/>
-          </a:p>
-          <a:p>
-            <a:pPr lvl="1"/>
-            <a:r>
-              <a:rPr lang="en-US" dirty="0" err="1"/>
-              <a:t>IdentityFile</a:t>
-            </a:r>
-            <a:r>
-              <a:rPr lang="en-US" dirty="0"/>
-              <a:t> ~/.</a:t>
-            </a:r>
-            <a:r>
-              <a:rPr lang="en-US" dirty="0" err="1" smtClean="0"/>
-              <a:t>ssh</a:t>
-            </a:r>
-            <a:r>
-              <a:rPr lang="en-US" dirty="0" smtClean="0"/>
-              <a:t>/</a:t>
-            </a:r>
-            <a:r>
-              <a:rPr lang="en-US" dirty="0" err="1" smtClean="0"/>
-              <a:t>galvanize_capstone.pem</a:t>
-            </a:r>
-            <a:endParaRPr lang="en-US" dirty="0" smtClean="0"/>
-          </a:p>
-        </p:txBody>
-      </p:sp>
-      <p:sp>
-        <p:nvSpPr>
-          <p:cNvPr id="4" name="TextBox 3"/>
-          <p:cNvSpPr txBox="1"/>
-          <p:nvPr/>
-        </p:nvSpPr>
-        <p:spPr>
-          <a:xfrm>
-            <a:off x="785004" y="2793917"/>
-            <a:ext cx="2375394" cy="369332"/>
-          </a:xfrm>
-          <a:prstGeom prst="rect">
-            <a:avLst/>
-          </a:prstGeom>
-          <a:noFill/>
-        </p:spPr>
-        <p:txBody>
-          <a:bodyPr wrap="none" rtlCol="0">
-            <a:spAutoFit/>
-          </a:bodyPr>
-          <a:lstStyle/>
-          <a:p>
-            <a:r>
-              <a:rPr lang="en-US" dirty="0" err="1" smtClean="0"/>
-              <a:t>Ssh</a:t>
-            </a:r>
-            <a:r>
-              <a:rPr lang="en-US" dirty="0" smtClean="0"/>
-              <a:t> </a:t>
-            </a:r>
-            <a:r>
-              <a:rPr lang="en-US" dirty="0" err="1" smtClean="0"/>
-              <a:t>galvanize_capstone</a:t>
-            </a:r>
-            <a:endParaRPr lang="en-US" dirty="0" smtClean="0"/>
-          </a:p>
-        </p:txBody>
-      </p:sp>
-      <p:sp>
-        <p:nvSpPr>
-          <p:cNvPr id="5" name="TextBox 4"/>
-          <p:cNvSpPr txBox="1"/>
-          <p:nvPr/>
-        </p:nvSpPr>
-        <p:spPr>
-          <a:xfrm>
-            <a:off x="799994" y="3845159"/>
-            <a:ext cx="10622139" cy="1754326"/>
-          </a:xfrm>
-          <a:prstGeom prst="rect">
-            <a:avLst/>
-          </a:prstGeom>
-          <a:noFill/>
-        </p:spPr>
-        <p:txBody>
-          <a:bodyPr wrap="none" rtlCol="0">
-            <a:spAutoFit/>
-          </a:bodyPr>
-          <a:lstStyle/>
-          <a:p>
-            <a:r>
-              <a:rPr lang="en-US" dirty="0" err="1"/>
-              <a:t>sudo</a:t>
-            </a:r>
-            <a:r>
-              <a:rPr lang="en-US" dirty="0"/>
-              <a:t> apt update </a:t>
-            </a:r>
-            <a:endParaRPr lang="en-US" dirty="0" smtClean="0"/>
-          </a:p>
-          <a:p>
-            <a:r>
-              <a:rPr lang="en-US" dirty="0" err="1" smtClean="0"/>
-              <a:t>sudo</a:t>
-            </a:r>
-            <a:r>
-              <a:rPr lang="en-US" dirty="0" smtClean="0"/>
-              <a:t> </a:t>
-            </a:r>
-            <a:r>
-              <a:rPr lang="en-US" dirty="0"/>
-              <a:t>apt </a:t>
-            </a:r>
-            <a:r>
-              <a:rPr lang="en-US" dirty="0" smtClean="0"/>
-              <a:t>upgrade</a:t>
-            </a:r>
-          </a:p>
-          <a:p>
-            <a:endParaRPr lang="en-US" dirty="0"/>
-          </a:p>
-          <a:p>
-            <a:r>
-              <a:rPr lang="en-US" dirty="0" err="1"/>
-              <a:t>wget</a:t>
-            </a:r>
-            <a:r>
-              <a:rPr lang="en-US" dirty="0"/>
-              <a:t> -S -T 10 -t 5 https://</a:t>
-            </a:r>
-            <a:r>
-              <a:rPr lang="en-US" dirty="0" err="1" smtClean="0"/>
-              <a:t>repo.continuum.io</a:t>
-            </a:r>
-            <a:r>
-              <a:rPr lang="en-US" dirty="0" smtClean="0"/>
-              <a:t>/archive/</a:t>
-            </a:r>
-            <a:r>
-              <a:rPr lang="en-US" dirty="0">
-                <a:hlinkClick r:id="rId2"/>
-              </a:rPr>
-              <a:t>Anaconda3-5.3.1-Linux-x86_64.sh</a:t>
-            </a:r>
-            <a:r>
-              <a:rPr lang="en-US" dirty="0" smtClean="0"/>
-              <a:t> </a:t>
-            </a:r>
-            <a:r>
-              <a:rPr lang="en-US" dirty="0"/>
-              <a:t>-O $</a:t>
-            </a:r>
-            <a:r>
-              <a:rPr lang="en-US" dirty="0" smtClean="0"/>
-              <a:t>HOME/</a:t>
-            </a:r>
-            <a:r>
-              <a:rPr lang="en-US" dirty="0" err="1" smtClean="0"/>
-              <a:t>anaconda.sh</a:t>
-            </a:r>
-            <a:endParaRPr lang="en-US" dirty="0" smtClean="0"/>
-          </a:p>
-          <a:p>
-            <a:endParaRPr lang="en-US" dirty="0"/>
-          </a:p>
-          <a:p>
-            <a:r>
-              <a:rPr lang="en-US" dirty="0" smtClean="0"/>
-              <a:t>Source ~/.</a:t>
-            </a:r>
-            <a:r>
-              <a:rPr lang="en-US" smtClean="0"/>
-              <a:t>bashrc</a:t>
-            </a:r>
-            <a:endParaRPr lang="en-US" dirty="0" smtClean="0"/>
-          </a:p>
-        </p:txBody>
-      </p:sp>
+            <a:endParaRPr lang="en-US"/>
+          </a:p>
+        </p:txBody>
+      </p:sp>
+      <p:pic>
+        <p:nvPicPr>
+          <p:cNvPr id="3" name="Picture 2"/>
+          <p:cNvPicPr>
+            <a:picLocks noChangeAspect="1"/>
+          </p:cNvPicPr>
+          <p:nvPr/>
+        </p:nvPicPr>
+        <p:blipFill>
+          <a:blip r:embed="rId2">
+            <a:extLst>
+              <a:ext uri="{28A0092B-C50C-407E-A947-70E740481C1C}">
+                <a14:useLocalDpi xmlns:a14="http://schemas.microsoft.com/office/drawing/2010/main" val="0"/>
+              </a:ext>
+            </a:extLst>
+          </a:blip>
+          <a:stretch>
+            <a:fillRect/>
+          </a:stretch>
+        </p:blipFill>
+        <p:spPr>
+          <a:xfrm>
+            <a:off x="683581" y="1840637"/>
+            <a:ext cx="10813002" cy="2287366"/>
+          </a:xfrm>
+          <a:prstGeom prst="rect">
+            <a:avLst/>
+          </a:prstGeom>
+        </p:spPr>
+      </p:pic>
     </p:spTree>
     <p:extLst>
       <p:ext uri="{BB962C8B-B14F-4D97-AF65-F5344CB8AC3E}">
-        <p14:creationId xmlns:p14="http://schemas.microsoft.com/office/powerpoint/2010/main" val="953308987"/>
+        <p14:creationId xmlns:p14="http://schemas.microsoft.com/office/powerpoint/2010/main" val="457337499"/>
       </p:ext>
     </p:extLst>
   </p:cSld>
@@ -4898,6 +4790,1584 @@
 </p:sld>
 </file>
 
+<file path=ppt/slides/slide20.xml><?xml version="1.0" encoding="utf-8"?>
+<p:sld xmlns:a="http://schemas.openxmlformats.org/drawingml/2006/main" xmlns:r="http://schemas.openxmlformats.org/officeDocument/2006/relationships" xmlns:p="http://schemas.openxmlformats.org/presentationml/2006/main">
+  <p:cSld>
+    <p:spTree>
+      <p:nvGrpSpPr>
+        <p:cNvPr id="1" name=""/>
+        <p:cNvGrpSpPr/>
+        <p:nvPr/>
+      </p:nvGrpSpPr>
+      <p:grpSpPr>
+        <a:xfrm>
+          <a:off x="0" y="0"/>
+          <a:ext cx="0" cy="0"/>
+          <a:chOff x="0" y="0"/>
+          <a:chExt cx="0" cy="0"/>
+        </a:xfrm>
+      </p:grpSpPr>
+      <p:sp>
+        <p:nvSpPr>
+          <p:cNvPr id="2" name="TextBox 1"/>
+          <p:cNvSpPr txBox="1"/>
+          <p:nvPr/>
+        </p:nvSpPr>
+        <p:spPr>
+          <a:xfrm>
+            <a:off x="785004" y="422694"/>
+            <a:ext cx="1374222" cy="369332"/>
+          </a:xfrm>
+          <a:prstGeom prst="rect">
+            <a:avLst/>
+          </a:prstGeom>
+          <a:noFill/>
+        </p:spPr>
+        <p:txBody>
+          <a:bodyPr wrap="none" rtlCol="0">
+            <a:spAutoFit/>
+          </a:bodyPr>
+          <a:lstStyle/>
+          <a:p>
+            <a:r>
+              <a:rPr lang="en-US" smtClean="0"/>
+              <a:t>EC2 Instance</a:t>
+            </a:r>
+          </a:p>
+        </p:txBody>
+      </p:sp>
+      <p:sp>
+        <p:nvSpPr>
+          <p:cNvPr id="3" name="TextBox 2"/>
+          <p:cNvSpPr txBox="1"/>
+          <p:nvPr/>
+        </p:nvSpPr>
+        <p:spPr>
+          <a:xfrm>
+            <a:off x="785004" y="1004011"/>
+            <a:ext cx="6826677" cy="1477328"/>
+          </a:xfrm>
+          <a:prstGeom prst="rect">
+            <a:avLst/>
+          </a:prstGeom>
+          <a:noFill/>
+        </p:spPr>
+        <p:txBody>
+          <a:bodyPr wrap="none" rtlCol="0">
+            <a:spAutoFit/>
+          </a:bodyPr>
+          <a:lstStyle/>
+          <a:p>
+            <a:r>
+              <a:rPr lang="en-US" dirty="0" smtClean="0"/>
+              <a:t>~/.</a:t>
+            </a:r>
+            <a:r>
+              <a:rPr lang="en-US" dirty="0" err="1" smtClean="0"/>
+              <a:t>ssh</a:t>
+            </a:r>
+            <a:r>
+              <a:rPr lang="en-US" dirty="0" smtClean="0"/>
+              <a:t>/</a:t>
+            </a:r>
+            <a:r>
+              <a:rPr lang="en-US" dirty="0" err="1" smtClean="0"/>
+              <a:t>config</a:t>
+            </a:r>
+            <a:endParaRPr lang="en-US" dirty="0" smtClean="0"/>
+          </a:p>
+          <a:p>
+            <a:r>
+              <a:rPr lang="en-US" dirty="0" smtClean="0"/>
+              <a:t>Host </a:t>
+            </a:r>
+            <a:r>
+              <a:rPr lang="en-US" dirty="0" err="1"/>
+              <a:t>galvanize_capstone</a:t>
+            </a:r>
+            <a:endParaRPr lang="en-US" dirty="0"/>
+          </a:p>
+          <a:p>
+            <a:pPr lvl="1"/>
+            <a:r>
+              <a:rPr lang="en-US" dirty="0" err="1"/>
+              <a:t>HostName</a:t>
+            </a:r>
+            <a:r>
+              <a:rPr lang="en-US" dirty="0"/>
+              <a:t> ec2-34-221-255-8.us-west-2.compute.amazonaws.com</a:t>
+            </a:r>
+          </a:p>
+          <a:p>
+            <a:pPr lvl="1"/>
+            <a:r>
+              <a:rPr lang="en-US" dirty="0"/>
+              <a:t>User </a:t>
+            </a:r>
+            <a:r>
+              <a:rPr lang="en-US" dirty="0" err="1"/>
+              <a:t>ubuntu</a:t>
+            </a:r>
+            <a:endParaRPr lang="en-US" dirty="0"/>
+          </a:p>
+          <a:p>
+            <a:pPr lvl="1"/>
+            <a:r>
+              <a:rPr lang="en-US" dirty="0" err="1"/>
+              <a:t>IdentityFile</a:t>
+            </a:r>
+            <a:r>
+              <a:rPr lang="en-US" dirty="0"/>
+              <a:t> ~/.</a:t>
+            </a:r>
+            <a:r>
+              <a:rPr lang="en-US" dirty="0" err="1" smtClean="0"/>
+              <a:t>ssh</a:t>
+            </a:r>
+            <a:r>
+              <a:rPr lang="en-US" dirty="0" smtClean="0"/>
+              <a:t>/</a:t>
+            </a:r>
+            <a:r>
+              <a:rPr lang="en-US" dirty="0" err="1" smtClean="0"/>
+              <a:t>galvanize_capstone.pem</a:t>
+            </a:r>
+            <a:endParaRPr lang="en-US" dirty="0" smtClean="0"/>
+          </a:p>
+        </p:txBody>
+      </p:sp>
+      <p:sp>
+        <p:nvSpPr>
+          <p:cNvPr id="4" name="TextBox 3"/>
+          <p:cNvSpPr txBox="1"/>
+          <p:nvPr/>
+        </p:nvSpPr>
+        <p:spPr>
+          <a:xfrm>
+            <a:off x="785004" y="2793917"/>
+            <a:ext cx="2375394" cy="369332"/>
+          </a:xfrm>
+          <a:prstGeom prst="rect">
+            <a:avLst/>
+          </a:prstGeom>
+          <a:noFill/>
+        </p:spPr>
+        <p:txBody>
+          <a:bodyPr wrap="none" rtlCol="0">
+            <a:spAutoFit/>
+          </a:bodyPr>
+          <a:lstStyle/>
+          <a:p>
+            <a:r>
+              <a:rPr lang="en-US" dirty="0" err="1" smtClean="0"/>
+              <a:t>Ssh</a:t>
+            </a:r>
+            <a:r>
+              <a:rPr lang="en-US" dirty="0" smtClean="0"/>
+              <a:t> </a:t>
+            </a:r>
+            <a:r>
+              <a:rPr lang="en-US" dirty="0" err="1" smtClean="0"/>
+              <a:t>galvanize_capstone</a:t>
+            </a:r>
+            <a:endParaRPr lang="en-US" dirty="0" smtClean="0"/>
+          </a:p>
+        </p:txBody>
+      </p:sp>
+      <p:sp>
+        <p:nvSpPr>
+          <p:cNvPr id="5" name="TextBox 4"/>
+          <p:cNvSpPr txBox="1"/>
+          <p:nvPr/>
+        </p:nvSpPr>
+        <p:spPr>
+          <a:xfrm>
+            <a:off x="799994" y="3845159"/>
+            <a:ext cx="10622139" cy="1754326"/>
+          </a:xfrm>
+          <a:prstGeom prst="rect">
+            <a:avLst/>
+          </a:prstGeom>
+          <a:noFill/>
+        </p:spPr>
+        <p:txBody>
+          <a:bodyPr wrap="none" rtlCol="0">
+            <a:spAutoFit/>
+          </a:bodyPr>
+          <a:lstStyle/>
+          <a:p>
+            <a:r>
+              <a:rPr lang="en-US" dirty="0" err="1"/>
+              <a:t>sudo</a:t>
+            </a:r>
+            <a:r>
+              <a:rPr lang="en-US" dirty="0"/>
+              <a:t> apt update </a:t>
+            </a:r>
+            <a:endParaRPr lang="en-US" dirty="0" smtClean="0"/>
+          </a:p>
+          <a:p>
+            <a:r>
+              <a:rPr lang="en-US" dirty="0" err="1" smtClean="0"/>
+              <a:t>sudo</a:t>
+            </a:r>
+            <a:r>
+              <a:rPr lang="en-US" dirty="0" smtClean="0"/>
+              <a:t> </a:t>
+            </a:r>
+            <a:r>
+              <a:rPr lang="en-US" dirty="0"/>
+              <a:t>apt </a:t>
+            </a:r>
+            <a:r>
+              <a:rPr lang="en-US" dirty="0" smtClean="0"/>
+              <a:t>upgrade</a:t>
+            </a:r>
+          </a:p>
+          <a:p>
+            <a:endParaRPr lang="en-US" dirty="0"/>
+          </a:p>
+          <a:p>
+            <a:r>
+              <a:rPr lang="en-US" dirty="0" err="1"/>
+              <a:t>wget</a:t>
+            </a:r>
+            <a:r>
+              <a:rPr lang="en-US" dirty="0"/>
+              <a:t> -S -T 10 -t 5 https://</a:t>
+            </a:r>
+            <a:r>
+              <a:rPr lang="en-US" dirty="0" err="1" smtClean="0"/>
+              <a:t>repo.continuum.io</a:t>
+            </a:r>
+            <a:r>
+              <a:rPr lang="en-US" dirty="0" smtClean="0"/>
+              <a:t>/archive/</a:t>
+            </a:r>
+            <a:r>
+              <a:rPr lang="en-US" dirty="0">
+                <a:hlinkClick r:id="rId2"/>
+              </a:rPr>
+              <a:t>Anaconda3-5.3.1-Linux-x86_64.sh</a:t>
+            </a:r>
+            <a:r>
+              <a:rPr lang="en-US" dirty="0" smtClean="0"/>
+              <a:t> </a:t>
+            </a:r>
+            <a:r>
+              <a:rPr lang="en-US" dirty="0"/>
+              <a:t>-O $</a:t>
+            </a:r>
+            <a:r>
+              <a:rPr lang="en-US" dirty="0" smtClean="0"/>
+              <a:t>HOME/</a:t>
+            </a:r>
+            <a:r>
+              <a:rPr lang="en-US" dirty="0" err="1" smtClean="0"/>
+              <a:t>anaconda.sh</a:t>
+            </a:r>
+            <a:endParaRPr lang="en-US" dirty="0" smtClean="0"/>
+          </a:p>
+          <a:p>
+            <a:endParaRPr lang="en-US" dirty="0"/>
+          </a:p>
+          <a:p>
+            <a:r>
+              <a:rPr lang="en-US" dirty="0" smtClean="0"/>
+              <a:t>Source ~/.</a:t>
+            </a:r>
+            <a:r>
+              <a:rPr lang="en-US" smtClean="0"/>
+              <a:t>bashrc</a:t>
+            </a:r>
+            <a:endParaRPr lang="en-US" dirty="0" smtClean="0"/>
+          </a:p>
+        </p:txBody>
+      </p:sp>
+    </p:spTree>
+    <p:extLst>
+      <p:ext uri="{BB962C8B-B14F-4D97-AF65-F5344CB8AC3E}">
+        <p14:creationId xmlns:p14="http://schemas.microsoft.com/office/powerpoint/2010/main" val="953308987"/>
+      </p:ext>
+    </p:extLst>
+  </p:cSld>
+  <p:clrMapOvr>
+    <a:masterClrMapping/>
+  </p:clrMapOvr>
+</p:sld>
+</file>
+
+<file path=ppt/slides/slide21.xml><?xml version="1.0" encoding="utf-8"?>
+<p:sld xmlns:a="http://schemas.openxmlformats.org/drawingml/2006/main" xmlns:r="http://schemas.openxmlformats.org/officeDocument/2006/relationships" xmlns:p="http://schemas.openxmlformats.org/presentationml/2006/main">
+  <p:cSld>
+    <p:spTree>
+      <p:nvGrpSpPr>
+        <p:cNvPr id="1" name=""/>
+        <p:cNvGrpSpPr/>
+        <p:nvPr/>
+      </p:nvGrpSpPr>
+      <p:grpSpPr>
+        <a:xfrm>
+          <a:off x="0" y="0"/>
+          <a:ext cx="0" cy="0"/>
+          <a:chOff x="0" y="0"/>
+          <a:chExt cx="0" cy="0"/>
+        </a:xfrm>
+      </p:grpSpPr>
+      <p:pic>
+        <p:nvPicPr>
+          <p:cNvPr id="3" name="Picture 2"/>
+          <p:cNvPicPr>
+            <a:picLocks noChangeAspect="1"/>
+          </p:cNvPicPr>
+          <p:nvPr/>
+        </p:nvPicPr>
+        <p:blipFill>
+          <a:blip r:embed="rId2">
+            <a:extLst>
+              <a:ext uri="{28A0092B-C50C-407E-A947-70E740481C1C}">
+                <a14:useLocalDpi xmlns:a14="http://schemas.microsoft.com/office/drawing/2010/main" val="0"/>
+              </a:ext>
+            </a:extLst>
+          </a:blip>
+          <a:stretch>
+            <a:fillRect/>
+          </a:stretch>
+        </p:blipFill>
+        <p:spPr>
+          <a:xfrm>
+            <a:off x="949569" y="195385"/>
+            <a:ext cx="10146323" cy="5403445"/>
+          </a:xfrm>
+          <a:prstGeom prst="rect">
+            <a:avLst/>
+          </a:prstGeom>
+        </p:spPr>
+      </p:pic>
+      <p:sp>
+        <p:nvSpPr>
+          <p:cNvPr id="4" name="TextBox 3"/>
+          <p:cNvSpPr txBox="1"/>
+          <p:nvPr/>
+        </p:nvSpPr>
+        <p:spPr>
+          <a:xfrm>
+            <a:off x="3601039" y="5948314"/>
+            <a:ext cx="4544899" cy="369332"/>
+          </a:xfrm>
+          <a:prstGeom prst="rect">
+            <a:avLst/>
+          </a:prstGeom>
+          <a:noFill/>
+        </p:spPr>
+        <p:txBody>
+          <a:bodyPr wrap="none" rtlCol="0">
+            <a:spAutoFit/>
+          </a:bodyPr>
+          <a:lstStyle/>
+          <a:p>
+            <a:r>
+              <a:rPr lang="en-US" dirty="0" smtClean="0"/>
+              <a:t>Trying </a:t>
+            </a:r>
+            <a:r>
+              <a:rPr lang="en-US" smtClean="0"/>
+              <a:t>to detect the bills that passed (in green)</a:t>
+            </a:r>
+            <a:endParaRPr lang="en-US"/>
+          </a:p>
+        </p:txBody>
+      </p:sp>
+    </p:spTree>
+    <p:extLst>
+      <p:ext uri="{BB962C8B-B14F-4D97-AF65-F5344CB8AC3E}">
+        <p14:creationId xmlns:p14="http://schemas.microsoft.com/office/powerpoint/2010/main" val="1003045499"/>
+      </p:ext>
+    </p:extLst>
+  </p:cSld>
+  <p:clrMapOvr>
+    <a:masterClrMapping/>
+  </p:clrMapOvr>
+</p:sld>
+</file>
+
+<file path=ppt/slides/slide22.xml><?xml version="1.0" encoding="utf-8"?>
+<p:sld xmlns:a="http://schemas.openxmlformats.org/drawingml/2006/main" xmlns:r="http://schemas.openxmlformats.org/officeDocument/2006/relationships" xmlns:p="http://schemas.openxmlformats.org/presentationml/2006/main">
+  <p:cSld>
+    <p:spTree>
+      <p:nvGrpSpPr>
+        <p:cNvPr id="1" name=""/>
+        <p:cNvGrpSpPr/>
+        <p:nvPr/>
+      </p:nvGrpSpPr>
+      <p:grpSpPr>
+        <a:xfrm>
+          <a:off x="0" y="0"/>
+          <a:ext cx="0" cy="0"/>
+          <a:chOff x="0" y="0"/>
+          <a:chExt cx="0" cy="0"/>
+        </a:xfrm>
+      </p:grpSpPr>
+      <p:sp>
+        <p:nvSpPr>
+          <p:cNvPr id="3" name="TextBox 2"/>
+          <p:cNvSpPr txBox="1"/>
+          <p:nvPr/>
+        </p:nvSpPr>
+        <p:spPr>
+          <a:xfrm>
+            <a:off x="584462" y="2290711"/>
+            <a:ext cx="3770722" cy="2585323"/>
+          </a:xfrm>
+          <a:prstGeom prst="rect">
+            <a:avLst/>
+          </a:prstGeom>
+          <a:noFill/>
+        </p:spPr>
+        <p:txBody>
+          <a:bodyPr wrap="square" rtlCol="0">
+            <a:spAutoFit/>
+          </a:bodyPr>
+          <a:lstStyle/>
+          <a:p>
+            <a:r>
+              <a:rPr lang="en-US" dirty="0" smtClean="0"/>
+              <a:t>Random Forest Classifier showing feature importance.</a:t>
+            </a:r>
+          </a:p>
+          <a:p>
+            <a:endParaRPr lang="en-US" dirty="0"/>
+          </a:p>
+          <a:p>
+            <a:r>
+              <a:rPr lang="en-US" dirty="0" smtClean="0"/>
+              <a:t>After looking at this, realized that the Congress ID will not be a part of the input data (every query will be from the most recent congress).</a:t>
+            </a:r>
+          </a:p>
+          <a:p>
+            <a:endParaRPr lang="en-US" dirty="0"/>
+          </a:p>
+          <a:p>
+            <a:r>
+              <a:rPr lang="en-US" dirty="0" smtClean="0"/>
+              <a:t>What happens if I take this out?</a:t>
+            </a:r>
+            <a:endParaRPr lang="en-US" dirty="0"/>
+          </a:p>
+        </p:txBody>
+      </p:sp>
+      <p:pic>
+        <p:nvPicPr>
+          <p:cNvPr id="4" name="Picture 3"/>
+          <p:cNvPicPr>
+            <a:picLocks noChangeAspect="1"/>
+          </p:cNvPicPr>
+          <p:nvPr/>
+        </p:nvPicPr>
+        <p:blipFill>
+          <a:blip r:embed="rId2">
+            <a:extLst>
+              <a:ext uri="{28A0092B-C50C-407E-A947-70E740481C1C}">
+                <a14:useLocalDpi xmlns:a14="http://schemas.microsoft.com/office/drawing/2010/main" val="0"/>
+              </a:ext>
+            </a:extLst>
+          </a:blip>
+          <a:stretch>
+            <a:fillRect/>
+          </a:stretch>
+        </p:blipFill>
+        <p:spPr>
+          <a:xfrm>
+            <a:off x="4485643" y="1000664"/>
+            <a:ext cx="7492373" cy="5471958"/>
+          </a:xfrm>
+          <a:prstGeom prst="rect">
+            <a:avLst/>
+          </a:prstGeom>
+        </p:spPr>
+      </p:pic>
+      <p:sp>
+        <p:nvSpPr>
+          <p:cNvPr id="5" name="TextBox 4"/>
+          <p:cNvSpPr txBox="1"/>
+          <p:nvPr/>
+        </p:nvSpPr>
+        <p:spPr>
+          <a:xfrm>
+            <a:off x="753035" y="344245"/>
+            <a:ext cx="4647304" cy="369332"/>
+          </a:xfrm>
+          <a:prstGeom prst="rect">
+            <a:avLst/>
+          </a:prstGeom>
+          <a:noFill/>
+        </p:spPr>
+        <p:txBody>
+          <a:bodyPr wrap="square" rtlCol="0">
+            <a:spAutoFit/>
+          </a:bodyPr>
+          <a:lstStyle/>
+          <a:p>
+            <a:r>
+              <a:rPr lang="en-US" dirty="0" smtClean="0"/>
+              <a:t>Random Forest Classification</a:t>
+            </a:r>
+            <a:endParaRPr lang="en-US" dirty="0"/>
+          </a:p>
+        </p:txBody>
+      </p:sp>
+    </p:spTree>
+    <p:extLst>
+      <p:ext uri="{BB962C8B-B14F-4D97-AF65-F5344CB8AC3E}">
+        <p14:creationId xmlns:p14="http://schemas.microsoft.com/office/powerpoint/2010/main" val="463161939"/>
+      </p:ext>
+    </p:extLst>
+  </p:cSld>
+  <p:clrMapOvr>
+    <a:masterClrMapping/>
+  </p:clrMapOvr>
+</p:sld>
+</file>
+
+<file path=ppt/slides/slide23.xml><?xml version="1.0" encoding="utf-8"?>
+<p:sld xmlns:a="http://schemas.openxmlformats.org/drawingml/2006/main" xmlns:r="http://schemas.openxmlformats.org/officeDocument/2006/relationships" xmlns:p="http://schemas.openxmlformats.org/presentationml/2006/main">
+  <p:cSld>
+    <p:spTree>
+      <p:nvGrpSpPr>
+        <p:cNvPr id="1" name=""/>
+        <p:cNvGrpSpPr/>
+        <p:nvPr/>
+      </p:nvGrpSpPr>
+      <p:grpSpPr>
+        <a:xfrm>
+          <a:off x="0" y="0"/>
+          <a:ext cx="0" cy="0"/>
+          <a:chOff x="0" y="0"/>
+          <a:chExt cx="0" cy="0"/>
+        </a:xfrm>
+      </p:grpSpPr>
+      <p:pic>
+        <p:nvPicPr>
+          <p:cNvPr id="2" name="Picture 1"/>
+          <p:cNvPicPr>
+            <a:picLocks noChangeAspect="1"/>
+          </p:cNvPicPr>
+          <p:nvPr/>
+        </p:nvPicPr>
+        <p:blipFill>
+          <a:blip r:embed="rId2">
+            <a:extLst>
+              <a:ext uri="{28A0092B-C50C-407E-A947-70E740481C1C}">
+                <a14:useLocalDpi xmlns:a14="http://schemas.microsoft.com/office/drawing/2010/main" val="0"/>
+              </a:ext>
+            </a:extLst>
+          </a:blip>
+          <a:stretch>
+            <a:fillRect/>
+          </a:stretch>
+        </p:blipFill>
+        <p:spPr>
+          <a:xfrm>
+            <a:off x="4815840" y="1074886"/>
+            <a:ext cx="7376160" cy="5353853"/>
+          </a:xfrm>
+          <a:prstGeom prst="rect">
+            <a:avLst/>
+          </a:prstGeom>
+        </p:spPr>
+      </p:pic>
+      <p:sp>
+        <p:nvSpPr>
+          <p:cNvPr id="3" name="TextBox 2"/>
+          <p:cNvSpPr txBox="1"/>
+          <p:nvPr/>
+        </p:nvSpPr>
+        <p:spPr>
+          <a:xfrm>
+            <a:off x="640393" y="930830"/>
+            <a:ext cx="4062953" cy="2031325"/>
+          </a:xfrm>
+          <a:prstGeom prst="rect">
+            <a:avLst/>
+          </a:prstGeom>
+          <a:noFill/>
+        </p:spPr>
+        <p:txBody>
+          <a:bodyPr wrap="square" rtlCol="0">
+            <a:spAutoFit/>
+          </a:bodyPr>
+          <a:lstStyle/>
+          <a:p>
+            <a:r>
+              <a:rPr lang="en-US" dirty="0" smtClean="0"/>
+              <a:t>Removing </a:t>
+            </a:r>
+            <a:r>
+              <a:rPr lang="en-US" dirty="0" err="1" smtClean="0"/>
+              <a:t>congress_id</a:t>
+            </a:r>
+            <a:r>
+              <a:rPr lang="en-US" dirty="0" smtClean="0"/>
+              <a:t> yields the following for feature importance</a:t>
+            </a:r>
+            <a:r>
+              <a:rPr lang="mr-IN" dirty="0" smtClean="0"/>
+              <a:t>…</a:t>
+            </a:r>
+            <a:endParaRPr lang="en-US" dirty="0" smtClean="0"/>
+          </a:p>
+          <a:p>
+            <a:endParaRPr lang="en-US" dirty="0" smtClean="0"/>
+          </a:p>
+          <a:p>
+            <a:r>
+              <a:rPr lang="en-US" dirty="0" smtClean="0"/>
+              <a:t>Bill character counts and number of cosponsors are definitely important, but we get the following scores if we leave them in:</a:t>
+            </a:r>
+            <a:endParaRPr lang="en-US" dirty="0"/>
+          </a:p>
+        </p:txBody>
+      </p:sp>
+      <p:pic>
+        <p:nvPicPr>
+          <p:cNvPr id="4" name="Picture 3"/>
+          <p:cNvPicPr>
+            <a:picLocks noChangeAspect="1"/>
+          </p:cNvPicPr>
+          <p:nvPr/>
+        </p:nvPicPr>
+        <p:blipFill>
+          <a:blip r:embed="rId3">
+            <a:extLst>
+              <a:ext uri="{28A0092B-C50C-407E-A947-70E740481C1C}">
+                <a14:useLocalDpi xmlns:a14="http://schemas.microsoft.com/office/drawing/2010/main" val="0"/>
+              </a:ext>
+            </a:extLst>
+          </a:blip>
+          <a:stretch>
+            <a:fillRect/>
+          </a:stretch>
+        </p:blipFill>
+        <p:spPr>
+          <a:xfrm>
+            <a:off x="1041725" y="3179409"/>
+            <a:ext cx="3035300" cy="1511300"/>
+          </a:xfrm>
+          <a:prstGeom prst="rect">
+            <a:avLst/>
+          </a:prstGeom>
+        </p:spPr>
+      </p:pic>
+      <p:sp>
+        <p:nvSpPr>
+          <p:cNvPr id="5" name="TextBox 4"/>
+          <p:cNvSpPr txBox="1"/>
+          <p:nvPr/>
+        </p:nvSpPr>
+        <p:spPr>
+          <a:xfrm>
+            <a:off x="612742" y="5467546"/>
+            <a:ext cx="3978110" cy="369332"/>
+          </a:xfrm>
+          <a:prstGeom prst="rect">
+            <a:avLst/>
+          </a:prstGeom>
+          <a:noFill/>
+        </p:spPr>
+        <p:txBody>
+          <a:bodyPr wrap="square" rtlCol="0">
+            <a:spAutoFit/>
+          </a:bodyPr>
+          <a:lstStyle/>
+          <a:p>
+            <a:r>
+              <a:rPr lang="en-US" dirty="0" smtClean="0"/>
+              <a:t>What happens if we remove them? </a:t>
+            </a:r>
+            <a:endParaRPr lang="en-US" dirty="0"/>
+          </a:p>
+        </p:txBody>
+      </p:sp>
+      <p:sp>
+        <p:nvSpPr>
+          <p:cNvPr id="6" name="TextBox 5"/>
+          <p:cNvSpPr txBox="1"/>
+          <p:nvPr/>
+        </p:nvSpPr>
+        <p:spPr>
+          <a:xfrm>
+            <a:off x="753035" y="344245"/>
+            <a:ext cx="4647304" cy="369332"/>
+          </a:xfrm>
+          <a:prstGeom prst="rect">
+            <a:avLst/>
+          </a:prstGeom>
+          <a:noFill/>
+        </p:spPr>
+        <p:txBody>
+          <a:bodyPr wrap="square" rtlCol="0">
+            <a:spAutoFit/>
+          </a:bodyPr>
+          <a:lstStyle/>
+          <a:p>
+            <a:r>
+              <a:rPr lang="en-US" dirty="0" smtClean="0"/>
+              <a:t>Random Forest Classification</a:t>
+            </a:r>
+            <a:endParaRPr lang="en-US" dirty="0"/>
+          </a:p>
+        </p:txBody>
+      </p:sp>
+    </p:spTree>
+    <p:extLst>
+      <p:ext uri="{BB962C8B-B14F-4D97-AF65-F5344CB8AC3E}">
+        <p14:creationId xmlns:p14="http://schemas.microsoft.com/office/powerpoint/2010/main" val="1429857375"/>
+      </p:ext>
+    </p:extLst>
+  </p:cSld>
+  <p:clrMapOvr>
+    <a:masterClrMapping/>
+  </p:clrMapOvr>
+</p:sld>
+</file>
+
+<file path=ppt/slides/slide24.xml><?xml version="1.0" encoding="utf-8"?>
+<p:sld xmlns:a="http://schemas.openxmlformats.org/drawingml/2006/main" xmlns:r="http://schemas.openxmlformats.org/officeDocument/2006/relationships" xmlns:p="http://schemas.openxmlformats.org/presentationml/2006/main">
+  <p:cSld>
+    <p:spTree>
+      <p:nvGrpSpPr>
+        <p:cNvPr id="1" name=""/>
+        <p:cNvGrpSpPr/>
+        <p:nvPr/>
+      </p:nvGrpSpPr>
+      <p:grpSpPr>
+        <a:xfrm>
+          <a:off x="0" y="0"/>
+          <a:ext cx="0" cy="0"/>
+          <a:chOff x="0" y="0"/>
+          <a:chExt cx="0" cy="0"/>
+        </a:xfrm>
+      </p:grpSpPr>
+      <p:pic>
+        <p:nvPicPr>
+          <p:cNvPr id="2" name="Picture 1"/>
+          <p:cNvPicPr>
+            <a:picLocks noChangeAspect="1"/>
+          </p:cNvPicPr>
+          <p:nvPr/>
+        </p:nvPicPr>
+        <p:blipFill>
+          <a:blip r:embed="rId2">
+            <a:extLst>
+              <a:ext uri="{28A0092B-C50C-407E-A947-70E740481C1C}">
+                <a14:useLocalDpi xmlns:a14="http://schemas.microsoft.com/office/drawing/2010/main" val="0"/>
+              </a:ext>
+            </a:extLst>
+          </a:blip>
+          <a:stretch>
+            <a:fillRect/>
+          </a:stretch>
+        </p:blipFill>
+        <p:spPr>
+          <a:xfrm>
+            <a:off x="5269844" y="1102936"/>
+            <a:ext cx="6922156" cy="4995028"/>
+          </a:xfrm>
+          <a:prstGeom prst="rect">
+            <a:avLst/>
+          </a:prstGeom>
+        </p:spPr>
+      </p:pic>
+      <p:sp>
+        <p:nvSpPr>
+          <p:cNvPr id="3" name="TextBox 2"/>
+          <p:cNvSpPr txBox="1"/>
+          <p:nvPr/>
+        </p:nvSpPr>
+        <p:spPr>
+          <a:xfrm>
+            <a:off x="631595" y="1178350"/>
+            <a:ext cx="4100660" cy="2585323"/>
+          </a:xfrm>
+          <a:prstGeom prst="rect">
+            <a:avLst/>
+          </a:prstGeom>
+          <a:noFill/>
+        </p:spPr>
+        <p:txBody>
+          <a:bodyPr wrap="square" rtlCol="0">
+            <a:spAutoFit/>
+          </a:bodyPr>
+          <a:lstStyle/>
+          <a:p>
+            <a:r>
+              <a:rPr lang="en-US" dirty="0" smtClean="0"/>
+              <a:t>With the dominating features removed, now we can see a little more detail on the importance of the other features.</a:t>
+            </a:r>
+          </a:p>
+          <a:p>
+            <a:endParaRPr lang="en-US" dirty="0"/>
+          </a:p>
+          <a:p>
+            <a:r>
+              <a:rPr lang="en-US" dirty="0" smtClean="0"/>
+              <a:t>In order to reduce the complexity of our model, we might be safe ignoring </a:t>
+            </a:r>
+            <a:r>
+              <a:rPr lang="en-US" dirty="0" err="1" smtClean="0"/>
+              <a:t>sponsor_state</a:t>
+            </a:r>
+            <a:r>
+              <a:rPr lang="en-US" dirty="0" smtClean="0"/>
+              <a:t>.</a:t>
+            </a:r>
+          </a:p>
+          <a:p>
+            <a:endParaRPr lang="en-US" dirty="0"/>
+          </a:p>
+          <a:p>
+            <a:r>
+              <a:rPr lang="en-US" dirty="0" smtClean="0"/>
+              <a:t>Our scores, though</a:t>
+            </a:r>
+            <a:r>
+              <a:rPr lang="mr-IN" dirty="0" smtClean="0"/>
+              <a:t>…</a:t>
+            </a:r>
+            <a:endParaRPr lang="en-US" dirty="0"/>
+          </a:p>
+        </p:txBody>
+      </p:sp>
+      <p:sp>
+        <p:nvSpPr>
+          <p:cNvPr id="4" name="TextBox 3"/>
+          <p:cNvSpPr txBox="1"/>
+          <p:nvPr/>
+        </p:nvSpPr>
+        <p:spPr>
+          <a:xfrm>
+            <a:off x="753035" y="344245"/>
+            <a:ext cx="4647304" cy="369332"/>
+          </a:xfrm>
+          <a:prstGeom prst="rect">
+            <a:avLst/>
+          </a:prstGeom>
+          <a:noFill/>
+        </p:spPr>
+        <p:txBody>
+          <a:bodyPr wrap="square" rtlCol="0">
+            <a:spAutoFit/>
+          </a:bodyPr>
+          <a:lstStyle/>
+          <a:p>
+            <a:r>
+              <a:rPr lang="en-US" dirty="0" smtClean="0"/>
+              <a:t>Random Forest Classification</a:t>
+            </a:r>
+            <a:endParaRPr lang="en-US" dirty="0"/>
+          </a:p>
+        </p:txBody>
+      </p:sp>
+    </p:spTree>
+    <p:extLst>
+      <p:ext uri="{BB962C8B-B14F-4D97-AF65-F5344CB8AC3E}">
+        <p14:creationId xmlns:p14="http://schemas.microsoft.com/office/powerpoint/2010/main" val="1854548627"/>
+      </p:ext>
+    </p:extLst>
+  </p:cSld>
+  <p:clrMapOvr>
+    <a:masterClrMapping/>
+  </p:clrMapOvr>
+</p:sld>
+</file>
+
+<file path=ppt/slides/slide25.xml><?xml version="1.0" encoding="utf-8"?>
+<p:sld xmlns:a="http://schemas.openxmlformats.org/drawingml/2006/main" xmlns:r="http://schemas.openxmlformats.org/officeDocument/2006/relationships" xmlns:p="http://schemas.openxmlformats.org/presentationml/2006/main">
+  <p:cSld>
+    <p:spTree>
+      <p:nvGrpSpPr>
+        <p:cNvPr id="1" name=""/>
+        <p:cNvGrpSpPr/>
+        <p:nvPr/>
+      </p:nvGrpSpPr>
+      <p:grpSpPr>
+        <a:xfrm>
+          <a:off x="0" y="0"/>
+          <a:ext cx="0" cy="0"/>
+          <a:chOff x="0" y="0"/>
+          <a:chExt cx="0" cy="0"/>
+        </a:xfrm>
+      </p:grpSpPr>
+      <p:pic>
+        <p:nvPicPr>
+          <p:cNvPr id="3" name="Picture 2"/>
+          <p:cNvPicPr>
+            <a:picLocks noChangeAspect="1"/>
+          </p:cNvPicPr>
+          <p:nvPr/>
+        </p:nvPicPr>
+        <p:blipFill>
+          <a:blip r:embed="rId2">
+            <a:extLst>
+              <a:ext uri="{28A0092B-C50C-407E-A947-70E740481C1C}">
+                <a14:useLocalDpi xmlns:a14="http://schemas.microsoft.com/office/drawing/2010/main" val="0"/>
+              </a:ext>
+            </a:extLst>
+          </a:blip>
+          <a:stretch>
+            <a:fillRect/>
+          </a:stretch>
+        </p:blipFill>
+        <p:spPr>
+          <a:xfrm>
+            <a:off x="4229984" y="1452282"/>
+            <a:ext cx="7683959" cy="3895464"/>
+          </a:xfrm>
+          <a:prstGeom prst="rect">
+            <a:avLst/>
+          </a:prstGeom>
+        </p:spPr>
+      </p:pic>
+      <p:sp>
+        <p:nvSpPr>
+          <p:cNvPr id="4" name="TextBox 3"/>
+          <p:cNvSpPr txBox="1"/>
+          <p:nvPr/>
+        </p:nvSpPr>
+        <p:spPr>
+          <a:xfrm>
+            <a:off x="417875" y="2409713"/>
+            <a:ext cx="3691546" cy="1477328"/>
+          </a:xfrm>
+          <a:prstGeom prst="rect">
+            <a:avLst/>
+          </a:prstGeom>
+          <a:noFill/>
+        </p:spPr>
+        <p:txBody>
+          <a:bodyPr wrap="square" rtlCol="0">
+            <a:spAutoFit/>
+          </a:bodyPr>
+          <a:lstStyle/>
+          <a:p>
+            <a:r>
+              <a:rPr lang="en-US" dirty="0" smtClean="0"/>
+              <a:t>Examination of how recall score varies with </a:t>
+            </a:r>
+            <a:r>
+              <a:rPr lang="en-US" dirty="0" err="1" smtClean="0"/>
+              <a:t>n_estimators</a:t>
+            </a:r>
+            <a:r>
+              <a:rPr lang="en-US" dirty="0" smtClean="0"/>
+              <a:t>.</a:t>
+            </a:r>
+          </a:p>
+          <a:p>
+            <a:endParaRPr lang="en-US" dirty="0"/>
+          </a:p>
+          <a:p>
+            <a:r>
+              <a:rPr lang="en-US" dirty="0" smtClean="0"/>
+              <a:t>Based on this, I set the </a:t>
+            </a:r>
+            <a:r>
+              <a:rPr lang="en-US" dirty="0" err="1" smtClean="0"/>
+              <a:t>n_estimators</a:t>
+            </a:r>
+            <a:r>
+              <a:rPr lang="en-US" dirty="0" smtClean="0"/>
+              <a:t> at 610</a:t>
+            </a:r>
+            <a:endParaRPr lang="en-US" dirty="0"/>
+          </a:p>
+        </p:txBody>
+      </p:sp>
+      <p:sp>
+        <p:nvSpPr>
+          <p:cNvPr id="5" name="TextBox 4"/>
+          <p:cNvSpPr txBox="1"/>
+          <p:nvPr/>
+        </p:nvSpPr>
+        <p:spPr>
+          <a:xfrm>
+            <a:off x="753035" y="344245"/>
+            <a:ext cx="4647304" cy="369332"/>
+          </a:xfrm>
+          <a:prstGeom prst="rect">
+            <a:avLst/>
+          </a:prstGeom>
+          <a:noFill/>
+        </p:spPr>
+        <p:txBody>
+          <a:bodyPr wrap="square" rtlCol="0">
+            <a:spAutoFit/>
+          </a:bodyPr>
+          <a:lstStyle/>
+          <a:p>
+            <a:r>
+              <a:rPr lang="en-US" dirty="0" smtClean="0"/>
+              <a:t>Random Forest Classification</a:t>
+            </a:r>
+            <a:endParaRPr lang="en-US" dirty="0"/>
+          </a:p>
+        </p:txBody>
+      </p:sp>
+    </p:spTree>
+    <p:extLst>
+      <p:ext uri="{BB962C8B-B14F-4D97-AF65-F5344CB8AC3E}">
+        <p14:creationId xmlns:p14="http://schemas.microsoft.com/office/powerpoint/2010/main" val="1365227597"/>
+      </p:ext>
+    </p:extLst>
+  </p:cSld>
+  <p:clrMapOvr>
+    <a:masterClrMapping/>
+  </p:clrMapOvr>
+</p:sld>
+</file>
+
+<file path=ppt/slides/slide26.xml><?xml version="1.0" encoding="utf-8"?>
+<p:sld xmlns:a="http://schemas.openxmlformats.org/drawingml/2006/main" xmlns:r="http://schemas.openxmlformats.org/officeDocument/2006/relationships" xmlns:p="http://schemas.openxmlformats.org/presentationml/2006/main">
+  <p:cSld>
+    <p:spTree>
+      <p:nvGrpSpPr>
+        <p:cNvPr id="1" name=""/>
+        <p:cNvGrpSpPr/>
+        <p:nvPr/>
+      </p:nvGrpSpPr>
+      <p:grpSpPr>
+        <a:xfrm>
+          <a:off x="0" y="0"/>
+          <a:ext cx="0" cy="0"/>
+          <a:chOff x="0" y="0"/>
+          <a:chExt cx="0" cy="0"/>
+        </a:xfrm>
+      </p:grpSpPr>
+      <p:pic>
+        <p:nvPicPr>
+          <p:cNvPr id="3" name="Picture 2"/>
+          <p:cNvPicPr>
+            <a:picLocks noChangeAspect="1"/>
+          </p:cNvPicPr>
+          <p:nvPr/>
+        </p:nvPicPr>
+        <p:blipFill>
+          <a:blip r:embed="rId2">
+            <a:extLst>
+              <a:ext uri="{28A0092B-C50C-407E-A947-70E740481C1C}">
+                <a14:useLocalDpi xmlns:a14="http://schemas.microsoft.com/office/drawing/2010/main" val="0"/>
+              </a:ext>
+            </a:extLst>
+          </a:blip>
+          <a:stretch>
+            <a:fillRect/>
+          </a:stretch>
+        </p:blipFill>
+        <p:spPr>
+          <a:xfrm>
+            <a:off x="5363850" y="138319"/>
+            <a:ext cx="6398251" cy="3312466"/>
+          </a:xfrm>
+          <a:prstGeom prst="rect">
+            <a:avLst/>
+          </a:prstGeom>
+        </p:spPr>
+      </p:pic>
+      <p:pic>
+        <p:nvPicPr>
+          <p:cNvPr id="4" name="Picture 3"/>
+          <p:cNvPicPr>
+            <a:picLocks noChangeAspect="1"/>
+          </p:cNvPicPr>
+          <p:nvPr/>
+        </p:nvPicPr>
+        <p:blipFill>
+          <a:blip r:embed="rId3">
+            <a:extLst>
+              <a:ext uri="{28A0092B-C50C-407E-A947-70E740481C1C}">
+                <a14:useLocalDpi xmlns:a14="http://schemas.microsoft.com/office/drawing/2010/main" val="0"/>
+              </a:ext>
+            </a:extLst>
+          </a:blip>
+          <a:stretch>
+            <a:fillRect/>
+          </a:stretch>
+        </p:blipFill>
+        <p:spPr>
+          <a:xfrm>
+            <a:off x="5363851" y="3450785"/>
+            <a:ext cx="6472156" cy="3250493"/>
+          </a:xfrm>
+          <a:prstGeom prst="rect">
+            <a:avLst/>
+          </a:prstGeom>
+        </p:spPr>
+      </p:pic>
+      <p:sp>
+        <p:nvSpPr>
+          <p:cNvPr id="5" name="TextBox 4"/>
+          <p:cNvSpPr txBox="1"/>
+          <p:nvPr/>
+        </p:nvSpPr>
+        <p:spPr>
+          <a:xfrm>
+            <a:off x="1225485" y="556181"/>
+            <a:ext cx="2764283" cy="369332"/>
+          </a:xfrm>
+          <a:prstGeom prst="rect">
+            <a:avLst/>
+          </a:prstGeom>
+          <a:noFill/>
+        </p:spPr>
+        <p:txBody>
+          <a:bodyPr wrap="none" rtlCol="0">
+            <a:spAutoFit/>
+          </a:bodyPr>
+          <a:lstStyle/>
+          <a:p>
+            <a:r>
+              <a:rPr lang="en-US" dirty="0" smtClean="0"/>
+              <a:t>Gradient </a:t>
+            </a:r>
+            <a:r>
+              <a:rPr lang="en-US" smtClean="0"/>
+              <a:t>Boosting Classifier</a:t>
+            </a:r>
+            <a:endParaRPr lang="en-US"/>
+          </a:p>
+        </p:txBody>
+      </p:sp>
+      <p:pic>
+        <p:nvPicPr>
+          <p:cNvPr id="6" name="Picture 5"/>
+          <p:cNvPicPr>
+            <a:picLocks noChangeAspect="1"/>
+          </p:cNvPicPr>
+          <p:nvPr/>
+        </p:nvPicPr>
+        <p:blipFill>
+          <a:blip r:embed="rId4">
+            <a:extLst>
+              <a:ext uri="{28A0092B-C50C-407E-A947-70E740481C1C}">
+                <a14:useLocalDpi xmlns:a14="http://schemas.microsoft.com/office/drawing/2010/main" val="0"/>
+              </a:ext>
+            </a:extLst>
+          </a:blip>
+          <a:stretch>
+            <a:fillRect/>
+          </a:stretch>
+        </p:blipFill>
+        <p:spPr>
+          <a:xfrm>
+            <a:off x="1225485" y="4333081"/>
+            <a:ext cx="3175000" cy="1485900"/>
+          </a:xfrm>
+          <a:prstGeom prst="rect">
+            <a:avLst/>
+          </a:prstGeom>
+        </p:spPr>
+      </p:pic>
+      <p:sp>
+        <p:nvSpPr>
+          <p:cNvPr id="7" name="TextBox 6"/>
+          <p:cNvSpPr txBox="1"/>
+          <p:nvPr/>
+        </p:nvSpPr>
+        <p:spPr>
+          <a:xfrm>
+            <a:off x="659350" y="3709578"/>
+            <a:ext cx="4307269" cy="369332"/>
+          </a:xfrm>
+          <a:prstGeom prst="rect">
+            <a:avLst/>
+          </a:prstGeom>
+          <a:noFill/>
+        </p:spPr>
+        <p:txBody>
+          <a:bodyPr wrap="none" rtlCol="0">
+            <a:spAutoFit/>
+          </a:bodyPr>
+          <a:lstStyle/>
+          <a:p>
+            <a:r>
+              <a:rPr lang="en-US" dirty="0" smtClean="0"/>
+              <a:t>With learning rate = .05, </a:t>
+            </a:r>
+            <a:r>
+              <a:rPr lang="en-US" dirty="0" err="1" smtClean="0"/>
+              <a:t>n_estimators</a:t>
+            </a:r>
+            <a:r>
+              <a:rPr lang="en-US" dirty="0" smtClean="0"/>
+              <a:t> = 100</a:t>
+            </a:r>
+            <a:endParaRPr lang="en-US" dirty="0"/>
+          </a:p>
+        </p:txBody>
+      </p:sp>
+    </p:spTree>
+    <p:extLst>
+      <p:ext uri="{BB962C8B-B14F-4D97-AF65-F5344CB8AC3E}">
+        <p14:creationId xmlns:p14="http://schemas.microsoft.com/office/powerpoint/2010/main" val="1882105613"/>
+      </p:ext>
+    </p:extLst>
+  </p:cSld>
+  <p:clrMapOvr>
+    <a:masterClrMapping/>
+  </p:clrMapOvr>
+</p:sld>
+</file>
+
+<file path=ppt/slides/slide27.xml><?xml version="1.0" encoding="utf-8"?>
+<p:sld xmlns:a="http://schemas.openxmlformats.org/drawingml/2006/main" xmlns:r="http://schemas.openxmlformats.org/officeDocument/2006/relationships" xmlns:p="http://schemas.openxmlformats.org/presentationml/2006/main">
+  <p:cSld>
+    <p:spTree>
+      <p:nvGrpSpPr>
+        <p:cNvPr id="1" name=""/>
+        <p:cNvGrpSpPr/>
+        <p:nvPr/>
+      </p:nvGrpSpPr>
+      <p:grpSpPr>
+        <a:xfrm>
+          <a:off x="0" y="0"/>
+          <a:ext cx="0" cy="0"/>
+          <a:chOff x="0" y="0"/>
+          <a:chExt cx="0" cy="0"/>
+        </a:xfrm>
+      </p:grpSpPr>
+      <p:pic>
+        <p:nvPicPr>
+          <p:cNvPr id="2" name="Picture 1"/>
+          <p:cNvPicPr>
+            <a:picLocks noChangeAspect="1"/>
+          </p:cNvPicPr>
+          <p:nvPr/>
+        </p:nvPicPr>
+        <p:blipFill>
+          <a:blip r:embed="rId2">
+            <a:extLst>
+              <a:ext uri="{28A0092B-C50C-407E-A947-70E740481C1C}">
+                <a14:useLocalDpi xmlns:a14="http://schemas.microsoft.com/office/drawing/2010/main" val="0"/>
+              </a:ext>
+            </a:extLst>
+          </a:blip>
+          <a:stretch>
+            <a:fillRect/>
+          </a:stretch>
+        </p:blipFill>
+        <p:spPr>
+          <a:xfrm>
+            <a:off x="3869474" y="1346985"/>
+            <a:ext cx="8039460" cy="4064000"/>
+          </a:xfrm>
+          <a:prstGeom prst="rect">
+            <a:avLst/>
+          </a:prstGeom>
+        </p:spPr>
+      </p:pic>
+      <p:sp>
+        <p:nvSpPr>
+          <p:cNvPr id="3" name="TextBox 2"/>
+          <p:cNvSpPr txBox="1"/>
+          <p:nvPr/>
+        </p:nvSpPr>
+        <p:spPr>
+          <a:xfrm>
+            <a:off x="1338606" y="3009653"/>
+            <a:ext cx="1600375" cy="369332"/>
+          </a:xfrm>
+          <a:prstGeom prst="rect">
+            <a:avLst/>
+          </a:prstGeom>
+          <a:noFill/>
+        </p:spPr>
+        <p:txBody>
+          <a:bodyPr wrap="none" rtlCol="0">
+            <a:spAutoFit/>
+          </a:bodyPr>
+          <a:lstStyle/>
+          <a:p>
+            <a:r>
+              <a:rPr lang="en-US" dirty="0" err="1" smtClean="0"/>
+              <a:t>Max_depth</a:t>
+            </a:r>
+            <a:r>
+              <a:rPr lang="en-US" dirty="0" smtClean="0"/>
+              <a:t> = 3</a:t>
+            </a:r>
+            <a:endParaRPr lang="en-US" dirty="0"/>
+          </a:p>
+        </p:txBody>
+      </p:sp>
+    </p:spTree>
+    <p:extLst>
+      <p:ext uri="{BB962C8B-B14F-4D97-AF65-F5344CB8AC3E}">
+        <p14:creationId xmlns:p14="http://schemas.microsoft.com/office/powerpoint/2010/main" val="1233903123"/>
+      </p:ext>
+    </p:extLst>
+  </p:cSld>
+  <p:clrMapOvr>
+    <a:masterClrMapping/>
+  </p:clrMapOvr>
+</p:sld>
+</file>
+
+<file path=ppt/slides/slide28.xml><?xml version="1.0" encoding="utf-8"?>
+<p:sld xmlns:a="http://schemas.openxmlformats.org/drawingml/2006/main" xmlns:r="http://schemas.openxmlformats.org/officeDocument/2006/relationships" xmlns:p="http://schemas.openxmlformats.org/presentationml/2006/main">
+  <p:cSld>
+    <p:spTree>
+      <p:nvGrpSpPr>
+        <p:cNvPr id="1" name=""/>
+        <p:cNvGrpSpPr/>
+        <p:nvPr/>
+      </p:nvGrpSpPr>
+      <p:grpSpPr>
+        <a:xfrm>
+          <a:off x="0" y="0"/>
+          <a:ext cx="0" cy="0"/>
+          <a:chOff x="0" y="0"/>
+          <a:chExt cx="0" cy="0"/>
+        </a:xfrm>
+      </p:grpSpPr>
+      <p:pic>
+        <p:nvPicPr>
+          <p:cNvPr id="2" name="Picture 1"/>
+          <p:cNvPicPr>
+            <a:picLocks noChangeAspect="1"/>
+          </p:cNvPicPr>
+          <p:nvPr/>
+        </p:nvPicPr>
+        <p:blipFill>
+          <a:blip r:embed="rId2">
+            <a:extLst>
+              <a:ext uri="{28A0092B-C50C-407E-A947-70E740481C1C}">
+                <a14:useLocalDpi xmlns:a14="http://schemas.microsoft.com/office/drawing/2010/main" val="0"/>
+              </a:ext>
+            </a:extLst>
+          </a:blip>
+          <a:stretch>
+            <a:fillRect/>
+          </a:stretch>
+        </p:blipFill>
+        <p:spPr>
+          <a:xfrm>
+            <a:off x="3479517" y="1102281"/>
+            <a:ext cx="8475765" cy="4289852"/>
+          </a:xfrm>
+          <a:prstGeom prst="rect">
+            <a:avLst/>
+          </a:prstGeom>
+        </p:spPr>
+      </p:pic>
+      <p:sp>
+        <p:nvSpPr>
+          <p:cNvPr id="3" name="TextBox 2"/>
+          <p:cNvSpPr txBox="1"/>
+          <p:nvPr/>
+        </p:nvSpPr>
+        <p:spPr>
+          <a:xfrm>
+            <a:off x="1385740" y="989814"/>
+            <a:ext cx="1974258" cy="369332"/>
+          </a:xfrm>
+          <a:prstGeom prst="rect">
+            <a:avLst/>
+          </a:prstGeom>
+          <a:noFill/>
+        </p:spPr>
+        <p:txBody>
+          <a:bodyPr wrap="none" rtlCol="0">
+            <a:spAutoFit/>
+          </a:bodyPr>
+          <a:lstStyle/>
+          <a:p>
+            <a:r>
+              <a:rPr lang="en-US" dirty="0" err="1" smtClean="0"/>
+              <a:t>AdaBoost</a:t>
+            </a:r>
+            <a:r>
+              <a:rPr lang="en-US" dirty="0" smtClean="0"/>
+              <a:t> Classifier</a:t>
+            </a:r>
+            <a:endParaRPr lang="en-US" dirty="0"/>
+          </a:p>
+        </p:txBody>
+      </p:sp>
+      <p:sp>
+        <p:nvSpPr>
+          <p:cNvPr id="4" name="TextBox 3"/>
+          <p:cNvSpPr txBox="1"/>
+          <p:nvPr/>
+        </p:nvSpPr>
+        <p:spPr>
+          <a:xfrm>
+            <a:off x="1519287" y="2273431"/>
+            <a:ext cx="1600375" cy="369332"/>
+          </a:xfrm>
+          <a:prstGeom prst="rect">
+            <a:avLst/>
+          </a:prstGeom>
+          <a:noFill/>
+        </p:spPr>
+        <p:txBody>
+          <a:bodyPr wrap="none" rtlCol="0">
+            <a:spAutoFit/>
+          </a:bodyPr>
+          <a:lstStyle/>
+          <a:p>
+            <a:r>
+              <a:rPr lang="en-US" dirty="0" err="1" smtClean="0"/>
+              <a:t>Max_depth</a:t>
+            </a:r>
+            <a:r>
+              <a:rPr lang="en-US" dirty="0" smtClean="0"/>
+              <a:t> = 4</a:t>
+            </a:r>
+            <a:endParaRPr lang="en-US" dirty="0"/>
+          </a:p>
+        </p:txBody>
+      </p:sp>
+    </p:spTree>
+    <p:extLst>
+      <p:ext uri="{BB962C8B-B14F-4D97-AF65-F5344CB8AC3E}">
+        <p14:creationId xmlns:p14="http://schemas.microsoft.com/office/powerpoint/2010/main" val="1493375693"/>
+      </p:ext>
+    </p:extLst>
+  </p:cSld>
+  <p:clrMapOvr>
+    <a:masterClrMapping/>
+  </p:clrMapOvr>
+</p:sld>
+</file>
+
+<file path=ppt/slides/slide29.xml><?xml version="1.0" encoding="utf-8"?>
+<p:sld xmlns:a="http://schemas.openxmlformats.org/drawingml/2006/main" xmlns:r="http://schemas.openxmlformats.org/officeDocument/2006/relationships" xmlns:p="http://schemas.openxmlformats.org/presentationml/2006/main">
+  <p:cSld>
+    <p:spTree>
+      <p:nvGrpSpPr>
+        <p:cNvPr id="1" name=""/>
+        <p:cNvGrpSpPr/>
+        <p:nvPr/>
+      </p:nvGrpSpPr>
+      <p:grpSpPr>
+        <a:xfrm>
+          <a:off x="0" y="0"/>
+          <a:ext cx="0" cy="0"/>
+          <a:chOff x="0" y="0"/>
+          <a:chExt cx="0" cy="0"/>
+        </a:xfrm>
+      </p:grpSpPr>
+      <p:sp>
+        <p:nvSpPr>
+          <p:cNvPr id="3" name="TextBox 2"/>
+          <p:cNvSpPr txBox="1"/>
+          <p:nvPr/>
+        </p:nvSpPr>
+        <p:spPr>
+          <a:xfrm>
+            <a:off x="1385740" y="989814"/>
+            <a:ext cx="1974258" cy="369332"/>
+          </a:xfrm>
+          <a:prstGeom prst="rect">
+            <a:avLst/>
+          </a:prstGeom>
+          <a:noFill/>
+        </p:spPr>
+        <p:txBody>
+          <a:bodyPr wrap="none" rtlCol="0">
+            <a:spAutoFit/>
+          </a:bodyPr>
+          <a:lstStyle/>
+          <a:p>
+            <a:r>
+              <a:rPr lang="en-US" dirty="0" err="1" smtClean="0"/>
+              <a:t>AdaBoost</a:t>
+            </a:r>
+            <a:r>
+              <a:rPr lang="en-US" dirty="0" smtClean="0"/>
+              <a:t> Classifier</a:t>
+            </a:r>
+            <a:endParaRPr lang="en-US" dirty="0"/>
+          </a:p>
+        </p:txBody>
+      </p:sp>
+      <p:sp>
+        <p:nvSpPr>
+          <p:cNvPr id="4" name="TextBox 3"/>
+          <p:cNvSpPr txBox="1"/>
+          <p:nvPr/>
+        </p:nvSpPr>
+        <p:spPr>
+          <a:xfrm>
+            <a:off x="1519287" y="2273431"/>
+            <a:ext cx="1600375" cy="369332"/>
+          </a:xfrm>
+          <a:prstGeom prst="rect">
+            <a:avLst/>
+          </a:prstGeom>
+          <a:noFill/>
+        </p:spPr>
+        <p:txBody>
+          <a:bodyPr wrap="none" rtlCol="0">
+            <a:spAutoFit/>
+          </a:bodyPr>
+          <a:lstStyle/>
+          <a:p>
+            <a:r>
+              <a:rPr lang="en-US" dirty="0" err="1" smtClean="0"/>
+              <a:t>Max_depth</a:t>
+            </a:r>
+            <a:r>
+              <a:rPr lang="en-US" dirty="0" smtClean="0"/>
+              <a:t> = 5</a:t>
+            </a:r>
+            <a:endParaRPr lang="en-US" dirty="0"/>
+          </a:p>
+        </p:txBody>
+      </p:sp>
+      <p:pic>
+        <p:nvPicPr>
+          <p:cNvPr id="5" name="Picture 4"/>
+          <p:cNvPicPr>
+            <a:picLocks noChangeAspect="1"/>
+          </p:cNvPicPr>
+          <p:nvPr/>
+        </p:nvPicPr>
+        <p:blipFill>
+          <a:blip r:embed="rId2">
+            <a:extLst>
+              <a:ext uri="{28A0092B-C50C-407E-A947-70E740481C1C}">
+                <a14:useLocalDpi xmlns:a14="http://schemas.microsoft.com/office/drawing/2010/main" val="0"/>
+              </a:ext>
+            </a:extLst>
+          </a:blip>
+          <a:stretch>
+            <a:fillRect/>
+          </a:stretch>
+        </p:blipFill>
+        <p:spPr>
+          <a:xfrm>
+            <a:off x="3110235" y="1340292"/>
+            <a:ext cx="8595789" cy="4375509"/>
+          </a:xfrm>
+          <a:prstGeom prst="rect">
+            <a:avLst/>
+          </a:prstGeom>
+        </p:spPr>
+      </p:pic>
+    </p:spTree>
+    <p:extLst>
+      <p:ext uri="{BB962C8B-B14F-4D97-AF65-F5344CB8AC3E}">
+        <p14:creationId xmlns:p14="http://schemas.microsoft.com/office/powerpoint/2010/main" val="1652437291"/>
+      </p:ext>
+    </p:extLst>
+  </p:cSld>
+  <p:clrMapOvr>
+    <a:masterClrMapping/>
+  </p:clrMapOvr>
+</p:sld>
+</file>
+
 <file path=ppt/slides/slide3.xml><?xml version="1.0" encoding="utf-8"?>
 <p:sld xmlns:a="http://schemas.openxmlformats.org/drawingml/2006/main" xmlns:r="http://schemas.openxmlformats.org/officeDocument/2006/relationships" xmlns:p="http://schemas.openxmlformats.org/presentationml/2006/main">
   <p:cSld>
@@ -5086,6 +6556,160 @@
     <p:extLst>
       <p:ext uri="{BB962C8B-B14F-4D97-AF65-F5344CB8AC3E}">
         <p14:creationId xmlns:p14="http://schemas.microsoft.com/office/powerpoint/2010/main" val="1115726291"/>
+      </p:ext>
+    </p:extLst>
+  </p:cSld>
+  <p:clrMapOvr>
+    <a:masterClrMapping/>
+  </p:clrMapOvr>
+</p:sld>
+</file>
+
+<file path=ppt/slides/slide30.xml><?xml version="1.0" encoding="utf-8"?>
+<p:sld xmlns:a="http://schemas.openxmlformats.org/drawingml/2006/main" xmlns:r="http://schemas.openxmlformats.org/officeDocument/2006/relationships" xmlns:p="http://schemas.openxmlformats.org/presentationml/2006/main">
+  <p:cSld>
+    <p:spTree>
+      <p:nvGrpSpPr>
+        <p:cNvPr id="1" name=""/>
+        <p:cNvGrpSpPr/>
+        <p:nvPr/>
+      </p:nvGrpSpPr>
+      <p:grpSpPr>
+        <a:xfrm>
+          <a:off x="0" y="0"/>
+          <a:ext cx="0" cy="0"/>
+          <a:chOff x="0" y="0"/>
+          <a:chExt cx="0" cy="0"/>
+        </a:xfrm>
+      </p:grpSpPr>
+      <p:sp>
+        <p:nvSpPr>
+          <p:cNvPr id="2" name="TextBox 1"/>
+          <p:cNvSpPr txBox="1"/>
+          <p:nvPr/>
+        </p:nvSpPr>
+        <p:spPr>
+          <a:xfrm>
+            <a:off x="452308" y="529858"/>
+            <a:ext cx="3401252" cy="369332"/>
+          </a:xfrm>
+          <a:prstGeom prst="rect">
+            <a:avLst/>
+          </a:prstGeom>
+          <a:noFill/>
+        </p:spPr>
+        <p:txBody>
+          <a:bodyPr wrap="none" rtlCol="0">
+            <a:spAutoFit/>
+          </a:bodyPr>
+          <a:lstStyle/>
+          <a:p>
+            <a:r>
+              <a:rPr lang="en-US" dirty="0" smtClean="0"/>
+              <a:t>Trying the same by removing state</a:t>
+            </a:r>
+            <a:endParaRPr lang="en-US" dirty="0"/>
+          </a:p>
+        </p:txBody>
+      </p:sp>
+      <p:pic>
+        <p:nvPicPr>
+          <p:cNvPr id="3" name="Picture 2"/>
+          <p:cNvPicPr>
+            <a:picLocks noChangeAspect="1"/>
+          </p:cNvPicPr>
+          <p:nvPr/>
+        </p:nvPicPr>
+        <p:blipFill>
+          <a:blip r:embed="rId2">
+            <a:extLst>
+              <a:ext uri="{28A0092B-C50C-407E-A947-70E740481C1C}">
+                <a14:useLocalDpi xmlns:a14="http://schemas.microsoft.com/office/drawing/2010/main" val="0"/>
+              </a:ext>
+            </a:extLst>
+          </a:blip>
+          <a:stretch>
+            <a:fillRect/>
+          </a:stretch>
+        </p:blipFill>
+        <p:spPr>
+          <a:xfrm>
+            <a:off x="4472406" y="329938"/>
+            <a:ext cx="5900698" cy="2980557"/>
+          </a:xfrm>
+          <a:prstGeom prst="rect">
+            <a:avLst/>
+          </a:prstGeom>
+        </p:spPr>
+      </p:pic>
+      <p:sp>
+        <p:nvSpPr>
+          <p:cNvPr id="4" name="TextBox 3"/>
+          <p:cNvSpPr txBox="1"/>
+          <p:nvPr/>
+        </p:nvSpPr>
+        <p:spPr>
+          <a:xfrm>
+            <a:off x="829559" y="2941163"/>
+            <a:ext cx="1996700" cy="369332"/>
+          </a:xfrm>
+          <a:prstGeom prst="rect">
+            <a:avLst/>
+          </a:prstGeom>
+          <a:noFill/>
+        </p:spPr>
+        <p:txBody>
+          <a:bodyPr wrap="none" rtlCol="0">
+            <a:spAutoFit/>
+          </a:bodyPr>
+          <a:lstStyle/>
+          <a:p>
+            <a:r>
+              <a:rPr lang="en-US" dirty="0" err="1" smtClean="0"/>
+              <a:t>Learning_rate</a:t>
+            </a:r>
+            <a:r>
+              <a:rPr lang="en-US" dirty="0" smtClean="0"/>
+              <a:t> = .05</a:t>
+            </a:r>
+            <a:endParaRPr lang="en-US" dirty="0"/>
+          </a:p>
+        </p:txBody>
+      </p:sp>
+      <p:pic>
+        <p:nvPicPr>
+          <p:cNvPr id="5" name="Picture 4"/>
+          <p:cNvPicPr>
+            <a:picLocks noChangeAspect="1"/>
+          </p:cNvPicPr>
+          <p:nvPr/>
+        </p:nvPicPr>
+        <p:blipFill>
+          <a:blip r:embed="rId3">
+            <a:extLst>
+              <a:ext uri="{28A0092B-C50C-407E-A947-70E740481C1C}">
+                <a14:useLocalDpi xmlns:a14="http://schemas.microsoft.com/office/drawing/2010/main" val="0"/>
+              </a:ext>
+            </a:extLst>
+          </a:blip>
+          <a:stretch>
+            <a:fillRect/>
+          </a:stretch>
+        </p:blipFill>
+        <p:spPr>
+          <a:xfrm>
+            <a:off x="7284771" y="3571336"/>
+            <a:ext cx="4240120" cy="3091754"/>
+          </a:xfrm>
+          <a:prstGeom prst="rect">
+            <a:avLst/>
+          </a:prstGeom>
+        </p:spPr>
+      </p:pic>
+    </p:spTree>
+    <p:extLst>
+      <p:ext uri="{BB962C8B-B14F-4D97-AF65-F5344CB8AC3E}">
+        <p14:creationId xmlns:p14="http://schemas.microsoft.com/office/powerpoint/2010/main" val="545905394"/>
       </p:ext>
     </p:extLst>
   </p:cSld>

</xml_diff>